<commit_message>
fixed horizontal scrollbar with overflow-x proprety on line 37 scss
</commit_message>
<xml_diff>
--- a/Livrable P3/SOUTENANCE.pptx
+++ b/Livrable P3/SOUTENANCE.pptx
@@ -5,15 +5,17 @@
     <p:sldMasterId id="2147483648" r:id="rId1"/>
   </p:sldMasterIdLst>
   <p:notesMasterIdLst>
-    <p:notesMasterId r:id="rId8"/>
+    <p:notesMasterId r:id="rId10"/>
   </p:notesMasterIdLst>
   <p:sldIdLst>
     <p:sldId id="256" r:id="rId2"/>
-    <p:sldId id="257" r:id="rId3"/>
-    <p:sldId id="258" r:id="rId4"/>
-    <p:sldId id="259" r:id="rId5"/>
-    <p:sldId id="260" r:id="rId6"/>
-    <p:sldId id="261" r:id="rId7"/>
+    <p:sldId id="263" r:id="rId3"/>
+    <p:sldId id="257" r:id="rId4"/>
+    <p:sldId id="262" r:id="rId5"/>
+    <p:sldId id="258" r:id="rId6"/>
+    <p:sldId id="259" r:id="rId7"/>
+    <p:sldId id="260" r:id="rId8"/>
+    <p:sldId id="261" r:id="rId9"/>
   </p:sldIdLst>
   <p:sldSz cx="12192000" cy="6858000"/>
   <p:notesSz cx="6858000" cy="9144000"/>
@@ -514,40 +516,7 @@
           <a:bodyPr/>
           <a:lstStyle/>
           <a:p>
-            <a:pPr marL="0" marR="0" lvl="0" indent="0" algn="l" defTabSz="914400" rtl="0" eaLnBrk="1" fontAlgn="auto" latinLnBrk="0" hangingPunct="1">
-              <a:lnSpc>
-                <a:spcPct val="100000"/>
-              </a:lnSpc>
-              <a:spcBef>
-                <a:spcPts val="0"/>
-              </a:spcBef>
-              <a:spcAft>
-                <a:spcPts val="0"/>
-              </a:spcAft>
-              <a:buClrTx/>
-              <a:buSzTx/>
-              <a:buFontTx/>
-              <a:buNone/>
-              <a:tabLst/>
-              <a:defRPr/>
-            </a:pPr>
-            <a:r>
-              <a:rPr lang="en-US" b="0" dirty="0">
-                <a:solidFill>
-                  <a:srgbClr val="8B949E"/>
-                </a:solidFill>
-                <a:effectLst/>
-                <a:latin typeface="Menlo" panose="020B0609030804020204" pitchFamily="49" charset="0"/>
-              </a:rPr>
-              <a:t>// HEART ANIMATION</a:t>
-            </a:r>
             <a:endParaRPr lang="en-FR" dirty="0"/>
-          </a:p>
-          <a:p>
-            <a:r>
-              <a:rPr lang="en-FR" dirty="0"/>
-              <a:t>Ligne 881 – style.scss</a:t>
-            </a:r>
           </a:p>
         </p:txBody>
       </p:sp>
@@ -568,7 +537,7 @@
           <a:p>
             <a:fld id="{C74514AE-876C-4849-BFE1-793BBEDE52D3}" type="slidenum">
               <a:rPr lang="en-FR" smtClean="0"/>
-              <a:t>2</a:t>
+              <a:t>1</a:t>
             </a:fld>
             <a:endParaRPr lang="en-FR"/>
           </a:p>
@@ -577,7 +546,7 @@
     </p:spTree>
     <p:extLst>
       <p:ext uri="{BB962C8B-B14F-4D97-AF65-F5344CB8AC3E}">
-        <p14:creationId xmlns:p14="http://schemas.microsoft.com/office/powerpoint/2010/main" val="4026529268"/>
+        <p14:creationId xmlns:p14="http://schemas.microsoft.com/office/powerpoint/2010/main" val="1699373197"/>
       </p:ext>
     </p:extLst>
   </p:cSld>
@@ -631,40 +600,7 @@
           <a:bodyPr/>
           <a:lstStyle/>
           <a:p>
-            <a:r>
-              <a:rPr lang="en-US" dirty="0"/>
-              <a:t>H</a:t>
-            </a:r>
-            <a:r>
-              <a:rPr lang="en-FR" dirty="0"/>
-              <a:t>over on dish card</a:t>
-            </a:r>
-          </a:p>
-          <a:p>
-            <a:r>
-              <a:rPr lang="en-FR" dirty="0"/>
-              <a:t>translateX on dish price</a:t>
-            </a:r>
-          </a:p>
-          <a:p>
-            <a:r>
-              <a:rPr lang="en-US" dirty="0"/>
-              <a:t>E</a:t>
-            </a:r>
-            <a:r>
-              <a:rPr lang="en-FR" dirty="0"/>
-              <a:t>lipsis on dish spec</a:t>
-            </a:r>
-          </a:p>
-          <a:p>
-            <a:r>
-              <a:rPr lang="en-US" dirty="0"/>
-              <a:t>W</a:t>
-            </a:r>
-            <a:r>
-              <a:rPr lang="en-FR" dirty="0"/>
-              <a:t>idth change on checkbox div</a:t>
-            </a:r>
+            <a:endParaRPr lang="en-FR" dirty="0"/>
           </a:p>
         </p:txBody>
       </p:sp>
@@ -685,7 +621,7 @@
           <a:p>
             <a:fld id="{C74514AE-876C-4849-BFE1-793BBEDE52D3}" type="slidenum">
               <a:rPr lang="en-FR" smtClean="0"/>
-              <a:t>3</a:t>
+              <a:t>2</a:t>
             </a:fld>
             <a:endParaRPr lang="en-FR"/>
           </a:p>
@@ -694,7 +630,7 @@
     </p:spTree>
     <p:extLst>
       <p:ext uri="{BB962C8B-B14F-4D97-AF65-F5344CB8AC3E}">
-        <p14:creationId xmlns:p14="http://schemas.microsoft.com/office/powerpoint/2010/main" val="682888896"/>
+        <p14:creationId xmlns:p14="http://schemas.microsoft.com/office/powerpoint/2010/main" val="1738433435"/>
       </p:ext>
     </p:extLst>
   </p:cSld>
@@ -748,45 +684,197 @@
           <a:bodyPr/>
           <a:lstStyle/>
           <a:p>
-            <a:r>
-              <a:rPr lang="en-US" sz="1200" b="0" dirty="0">
-                <a:solidFill>
-                  <a:schemeClr val="bg1"/>
+            <a:pPr marL="0" marR="0" lvl="0" indent="0" algn="l" defTabSz="914400" rtl="0" eaLnBrk="1" fontAlgn="auto" latinLnBrk="0" hangingPunct="1">
+              <a:lnSpc>
+                <a:spcPct val="100000"/>
+              </a:lnSpc>
+              <a:spcBef>
+                <a:spcPts val="0"/>
+              </a:spcBef>
+              <a:spcAft>
+                <a:spcPts val="0"/>
+              </a:spcAft>
+              <a:buClrTx/>
+              <a:buSzTx/>
+              <a:buFontTx/>
+              <a:buNone/>
+              <a:tabLst/>
+              <a:defRPr/>
+            </a:pPr>
+            <a:r>
+              <a:rPr lang="en-US" b="0" dirty="0">
+                <a:solidFill>
+                  <a:srgbClr val="8B949E"/>
                 </a:solidFill>
                 <a:effectLst/>
                 <a:latin typeface="Menlo" panose="020B0609030804020204" pitchFamily="49" charset="0"/>
               </a:rPr>
-              <a:t>// LOADER &amp;&amp; LOADER ANIMATION</a:t>
-            </a:r>
-          </a:p>
-          <a:p>
-            <a:r>
-              <a:rPr lang="en-US" sz="1200" dirty="0">
-                <a:solidFill>
-                  <a:schemeClr val="bg1"/>
-                </a:solidFill>
-                <a:latin typeface="Menlo" panose="020B0609030804020204" pitchFamily="49" charset="0"/>
-              </a:rPr>
-              <a:t>L76 – </a:t>
-            </a:r>
-            <a:r>
-              <a:rPr lang="en-US" sz="1200" dirty="0" err="1">
-                <a:solidFill>
-                  <a:schemeClr val="bg1"/>
-                </a:solidFill>
-                <a:latin typeface="Menlo" panose="020B0609030804020204" pitchFamily="49" charset="0"/>
-              </a:rPr>
-              <a:t>style.scss</a:t>
-            </a:r>
-            <a:endParaRPr lang="en-US" sz="1200" b="0" dirty="0">
-              <a:solidFill>
-                <a:schemeClr val="bg1"/>
-              </a:solidFill>
-              <a:effectLst/>
-              <a:latin typeface="Menlo" panose="020B0609030804020204" pitchFamily="49" charset="0"/>
-            </a:endParaRPr>
-          </a:p>
-          <a:p>
+              <a:t>// HEART ANIMATION</a:t>
+            </a:r>
+            <a:endParaRPr lang="en-FR" dirty="0"/>
+          </a:p>
+          <a:p>
+            <a:r>
+              <a:rPr lang="en-FR" dirty="0"/>
+              <a:t>Ligne 881 – style.scss</a:t>
+            </a:r>
+          </a:p>
+          <a:p>
+            <a:endParaRPr lang="en-FR" dirty="0"/>
+          </a:p>
+          <a:p>
+            <a:r>
+              <a:rPr lang="en-US" dirty="0" err="1"/>
+              <a:t>À</a:t>
+            </a:r>
+            <a:r>
+              <a:rPr lang="en-US" dirty="0"/>
+              <a:t> </a:t>
+            </a:r>
+            <a:r>
+              <a:rPr lang="en-US" dirty="0" err="1"/>
+              <a:t>terme</a:t>
+            </a:r>
+            <a:r>
+              <a:rPr lang="en-US" dirty="0"/>
+              <a:t>, les </a:t>
+            </a:r>
+            <a:r>
+              <a:rPr lang="en-US" dirty="0" err="1"/>
+              <a:t>visiteurs</a:t>
+            </a:r>
+            <a:r>
+              <a:rPr lang="en-US" dirty="0"/>
+              <a:t> </a:t>
+            </a:r>
+            <a:r>
+              <a:rPr lang="en-US" dirty="0" err="1"/>
+              <a:t>pourront</a:t>
+            </a:r>
+            <a:r>
+              <a:rPr lang="en-US" dirty="0"/>
+              <a:t> </a:t>
+            </a:r>
+            <a:r>
+              <a:rPr lang="en-US" dirty="0" err="1"/>
+              <a:t>sauvegarder</a:t>
+            </a:r>
+            <a:r>
+              <a:rPr lang="en-US" dirty="0"/>
+              <a:t> </a:t>
+            </a:r>
+            <a:r>
+              <a:rPr lang="en-US" dirty="0" err="1"/>
+              <a:t>leursmenus</a:t>
+            </a:r>
+            <a:r>
+              <a:rPr lang="en-US" dirty="0"/>
+              <a:t> </a:t>
+            </a:r>
+            <a:r>
+              <a:rPr lang="en-US" dirty="0" err="1"/>
+              <a:t>préférés</a:t>
+            </a:r>
+            <a:r>
+              <a:rPr lang="en-US" dirty="0"/>
+              <a:t>. Pour </a:t>
+            </a:r>
+            <a:r>
+              <a:rPr lang="en-US" dirty="0" err="1"/>
+              <a:t>ça</a:t>
+            </a:r>
+            <a:r>
+              <a:rPr lang="en-US" dirty="0"/>
+              <a:t>, un </a:t>
+            </a:r>
+            <a:r>
+              <a:rPr lang="en-US" dirty="0" err="1"/>
+              <a:t>bouton"J’aime"enformedecœurestprésent</a:t>
+            </a:r>
+            <a:r>
+              <a:rPr lang="en-US" dirty="0"/>
+              <a:t> sur </a:t>
+            </a:r>
+            <a:r>
+              <a:rPr lang="en-US" dirty="0" err="1"/>
+              <a:t>lamaquette.Auclic</a:t>
+            </a:r>
+            <a:r>
+              <a:rPr lang="en-US" dirty="0"/>
+              <a:t>, </a:t>
+            </a:r>
+            <a:r>
+              <a:rPr lang="en-US" dirty="0" err="1"/>
+              <a:t>ildevrase</a:t>
+            </a:r>
+            <a:r>
+              <a:rPr lang="en-US" dirty="0"/>
+              <a:t> </a:t>
+            </a:r>
+            <a:r>
+              <a:rPr lang="en-US" dirty="0" err="1"/>
+              <a:t>remplir</a:t>
+            </a:r>
+            <a:r>
+              <a:rPr lang="en-US" dirty="0"/>
+              <a:t> </a:t>
+            </a:r>
+            <a:r>
+              <a:rPr lang="en-US" dirty="0" err="1"/>
+              <a:t>progressivement</a:t>
+            </a:r>
+            <a:r>
+              <a:rPr lang="en-US" dirty="0"/>
+              <a:t>. Pour </a:t>
+            </a:r>
+            <a:r>
+              <a:rPr lang="en-US" dirty="0" err="1"/>
+              <a:t>cette</a:t>
+            </a:r>
+            <a:r>
+              <a:rPr lang="en-US" dirty="0"/>
+              <a:t> première version, </a:t>
+            </a:r>
+            <a:r>
+              <a:rPr lang="en-US" dirty="0" err="1"/>
+              <a:t>l’effet</a:t>
+            </a:r>
+            <a:r>
+              <a:rPr lang="en-US" dirty="0"/>
+              <a:t> </a:t>
+            </a:r>
+            <a:r>
+              <a:rPr lang="en-US" dirty="0" err="1"/>
+              <a:t>peut</a:t>
+            </a:r>
+            <a:r>
+              <a:rPr lang="en-US" dirty="0"/>
+              <a:t> </a:t>
+            </a:r>
+            <a:r>
+              <a:rPr lang="en-US" dirty="0" err="1"/>
+              <a:t>apparaîtreau</a:t>
+            </a:r>
+            <a:r>
+              <a:rPr lang="en-US" dirty="0"/>
+              <a:t> </a:t>
+            </a:r>
+            <a:r>
+              <a:rPr lang="en-US" dirty="0" err="1"/>
+              <a:t>survol</a:t>
+            </a:r>
+            <a:r>
+              <a:rPr lang="en-US" dirty="0"/>
+              <a:t> sur desktop au lieu du </a:t>
+            </a:r>
+            <a:r>
+              <a:rPr lang="en-US" dirty="0" err="1"/>
+              <a:t>clic</a:t>
+            </a:r>
+            <a:r>
+              <a:rPr lang="en-US" dirty="0"/>
+              <a:t>.</a:t>
+            </a:r>
             <a:endParaRPr lang="en-FR" dirty="0"/>
           </a:p>
         </p:txBody>
@@ -808,7 +896,7 @@
           <a:p>
             <a:fld id="{C74514AE-876C-4849-BFE1-793BBEDE52D3}" type="slidenum">
               <a:rPr lang="en-FR" smtClean="0"/>
-              <a:t>4</a:t>
+              <a:t>3</a:t>
             </a:fld>
             <a:endParaRPr lang="en-FR"/>
           </a:p>
@@ -817,7 +905,7 @@
     </p:spTree>
     <p:extLst>
       <p:ext uri="{BB962C8B-B14F-4D97-AF65-F5344CB8AC3E}">
-        <p14:creationId xmlns:p14="http://schemas.microsoft.com/office/powerpoint/2010/main" val="463433942"/>
+        <p14:creationId xmlns:p14="http://schemas.microsoft.com/office/powerpoint/2010/main" val="4026529268"/>
       </p:ext>
     </p:extLst>
   </p:cSld>
@@ -871,20 +959,7 @@
           <a:bodyPr/>
           <a:lstStyle/>
           <a:p>
-            <a:r>
-              <a:rPr lang="en-US" dirty="0"/>
-              <a:t>Mobile first :  min-width 320px // max-width 767.9px</a:t>
-            </a:r>
-          </a:p>
-          <a:p>
-            <a:r>
-              <a:rPr lang="en-US" dirty="0"/>
-              <a:t>B</a:t>
-            </a:r>
-            <a:r>
-              <a:rPr lang="en-FR" dirty="0"/>
-              <a:t>reakpoint pour tablettes &amp;&amp; desktops</a:t>
-            </a:r>
+            <a:endParaRPr lang="en-FR" dirty="0"/>
           </a:p>
         </p:txBody>
       </p:sp>
@@ -905,7 +980,7 @@
           <a:p>
             <a:fld id="{C74514AE-876C-4849-BFE1-793BBEDE52D3}" type="slidenum">
               <a:rPr lang="en-FR" smtClean="0"/>
-              <a:t>5</a:t>
+              <a:t>4</a:t>
             </a:fld>
             <a:endParaRPr lang="en-FR"/>
           </a:p>
@@ -914,7 +989,7 @@
     </p:spTree>
     <p:extLst>
       <p:ext uri="{BB962C8B-B14F-4D97-AF65-F5344CB8AC3E}">
-        <p14:creationId xmlns:p14="http://schemas.microsoft.com/office/powerpoint/2010/main" val="4181317934"/>
+        <p14:creationId xmlns:p14="http://schemas.microsoft.com/office/powerpoint/2010/main" val="4138601819"/>
       </p:ext>
     </p:extLst>
   </p:cSld>
@@ -969,6 +1044,343 @@
           <a:lstStyle/>
           <a:p>
             <a:r>
+              <a:rPr lang="en-US" dirty="0"/>
+              <a:t>H</a:t>
+            </a:r>
+            <a:r>
+              <a:rPr lang="en-FR" dirty="0"/>
+              <a:t>over on dish card</a:t>
+            </a:r>
+          </a:p>
+          <a:p>
+            <a:r>
+              <a:rPr lang="en-FR" dirty="0"/>
+              <a:t>translateX on dish price</a:t>
+            </a:r>
+          </a:p>
+          <a:p>
+            <a:r>
+              <a:rPr lang="en-US" dirty="0"/>
+              <a:t>E</a:t>
+            </a:r>
+            <a:r>
+              <a:rPr lang="en-FR" dirty="0"/>
+              <a:t>lipsis on dish spec</a:t>
+            </a:r>
+          </a:p>
+          <a:p>
+            <a:r>
+              <a:rPr lang="en-US" dirty="0"/>
+              <a:t>W</a:t>
+            </a:r>
+            <a:r>
+              <a:rPr lang="en-FR" dirty="0"/>
+              <a:t>idth change on checkbox div</a:t>
+            </a:r>
+          </a:p>
+        </p:txBody>
+      </p:sp>
+      <p:sp>
+        <p:nvSpPr>
+          <p:cNvPr id="4" name="Slide Number Placeholder 3"/>
+          <p:cNvSpPr>
+            <a:spLocks noGrp="1"/>
+          </p:cNvSpPr>
+          <p:nvPr>
+            <p:ph type="sldNum" sz="quarter" idx="5"/>
+          </p:nvPr>
+        </p:nvSpPr>
+        <p:spPr/>
+        <p:txBody>
+          <a:bodyPr/>
+          <a:lstStyle/>
+          <a:p>
+            <a:fld id="{C74514AE-876C-4849-BFE1-793BBEDE52D3}" type="slidenum">
+              <a:rPr lang="en-FR" smtClean="0"/>
+              <a:t>5</a:t>
+            </a:fld>
+            <a:endParaRPr lang="en-FR"/>
+          </a:p>
+        </p:txBody>
+      </p:sp>
+    </p:spTree>
+    <p:extLst>
+      <p:ext uri="{BB962C8B-B14F-4D97-AF65-F5344CB8AC3E}">
+        <p14:creationId xmlns:p14="http://schemas.microsoft.com/office/powerpoint/2010/main" val="682888896"/>
+      </p:ext>
+    </p:extLst>
+  </p:cSld>
+  <p:clrMapOvr>
+    <a:masterClrMapping/>
+  </p:clrMapOvr>
+</p:notes>
+</file>
+
+<file path=ppt/notesSlides/notesSlide6.xml><?xml version="1.0" encoding="utf-8"?>
+<p:notes xmlns:a="http://schemas.openxmlformats.org/drawingml/2006/main" xmlns:r="http://schemas.openxmlformats.org/officeDocument/2006/relationships" xmlns:p="http://schemas.openxmlformats.org/presentationml/2006/main">
+  <p:cSld>
+    <p:spTree>
+      <p:nvGrpSpPr>
+        <p:cNvPr id="1" name=""/>
+        <p:cNvGrpSpPr/>
+        <p:nvPr/>
+      </p:nvGrpSpPr>
+      <p:grpSpPr>
+        <a:xfrm>
+          <a:off x="0" y="0"/>
+          <a:ext cx="0" cy="0"/>
+          <a:chOff x="0" y="0"/>
+          <a:chExt cx="0" cy="0"/>
+        </a:xfrm>
+      </p:grpSpPr>
+      <p:sp>
+        <p:nvSpPr>
+          <p:cNvPr id="2" name="Slide Image Placeholder 1"/>
+          <p:cNvSpPr>
+            <a:spLocks noGrp="1" noRot="1" noChangeAspect="1"/>
+          </p:cNvSpPr>
+          <p:nvPr>
+            <p:ph type="sldImg"/>
+          </p:nvPr>
+        </p:nvSpPr>
+        <p:spPr/>
+      </p:sp>
+      <p:sp>
+        <p:nvSpPr>
+          <p:cNvPr id="3" name="Notes Placeholder 2"/>
+          <p:cNvSpPr>
+            <a:spLocks noGrp="1"/>
+          </p:cNvSpPr>
+          <p:nvPr>
+            <p:ph type="body" idx="1"/>
+          </p:nvPr>
+        </p:nvSpPr>
+        <p:spPr/>
+        <p:txBody>
+          <a:bodyPr/>
+          <a:lstStyle/>
+          <a:p>
+            <a:r>
+              <a:rPr lang="en-US" sz="1200" b="0" dirty="0">
+                <a:solidFill>
+                  <a:schemeClr val="bg1"/>
+                </a:solidFill>
+                <a:effectLst/>
+                <a:latin typeface="Menlo" panose="020B0609030804020204" pitchFamily="49" charset="0"/>
+              </a:rPr>
+              <a:t>// LOADER &amp;&amp; LOADER ANIMATION</a:t>
+            </a:r>
+          </a:p>
+          <a:p>
+            <a:r>
+              <a:rPr lang="en-US" sz="1200" dirty="0">
+                <a:solidFill>
+                  <a:schemeClr val="bg1"/>
+                </a:solidFill>
+                <a:latin typeface="Menlo" panose="020B0609030804020204" pitchFamily="49" charset="0"/>
+              </a:rPr>
+              <a:t>L76 – </a:t>
+            </a:r>
+            <a:r>
+              <a:rPr lang="en-US" sz="1200" dirty="0" err="1">
+                <a:solidFill>
+                  <a:schemeClr val="bg1"/>
+                </a:solidFill>
+                <a:latin typeface="Menlo" panose="020B0609030804020204" pitchFamily="49" charset="0"/>
+              </a:rPr>
+              <a:t>style.scss</a:t>
+            </a:r>
+            <a:endParaRPr lang="en-US" sz="1200" b="0" dirty="0">
+              <a:solidFill>
+                <a:schemeClr val="bg1"/>
+              </a:solidFill>
+              <a:effectLst/>
+              <a:latin typeface="Menlo" panose="020B0609030804020204" pitchFamily="49" charset="0"/>
+            </a:endParaRPr>
+          </a:p>
+          <a:p>
+            <a:endParaRPr lang="en-FR" dirty="0"/>
+          </a:p>
+        </p:txBody>
+      </p:sp>
+      <p:sp>
+        <p:nvSpPr>
+          <p:cNvPr id="4" name="Slide Number Placeholder 3"/>
+          <p:cNvSpPr>
+            <a:spLocks noGrp="1"/>
+          </p:cNvSpPr>
+          <p:nvPr>
+            <p:ph type="sldNum" sz="quarter" idx="5"/>
+          </p:nvPr>
+        </p:nvSpPr>
+        <p:spPr/>
+        <p:txBody>
+          <a:bodyPr/>
+          <a:lstStyle/>
+          <a:p>
+            <a:fld id="{C74514AE-876C-4849-BFE1-793BBEDE52D3}" type="slidenum">
+              <a:rPr lang="en-FR" smtClean="0"/>
+              <a:t>6</a:t>
+            </a:fld>
+            <a:endParaRPr lang="en-FR"/>
+          </a:p>
+        </p:txBody>
+      </p:sp>
+    </p:spTree>
+    <p:extLst>
+      <p:ext uri="{BB962C8B-B14F-4D97-AF65-F5344CB8AC3E}">
+        <p14:creationId xmlns:p14="http://schemas.microsoft.com/office/powerpoint/2010/main" val="463433942"/>
+      </p:ext>
+    </p:extLst>
+  </p:cSld>
+  <p:clrMapOvr>
+    <a:masterClrMapping/>
+  </p:clrMapOvr>
+</p:notes>
+</file>
+
+<file path=ppt/notesSlides/notesSlide7.xml><?xml version="1.0" encoding="utf-8"?>
+<p:notes xmlns:a="http://schemas.openxmlformats.org/drawingml/2006/main" xmlns:r="http://schemas.openxmlformats.org/officeDocument/2006/relationships" xmlns:p="http://schemas.openxmlformats.org/presentationml/2006/main">
+  <p:cSld>
+    <p:spTree>
+      <p:nvGrpSpPr>
+        <p:cNvPr id="1" name=""/>
+        <p:cNvGrpSpPr/>
+        <p:nvPr/>
+      </p:nvGrpSpPr>
+      <p:grpSpPr>
+        <a:xfrm>
+          <a:off x="0" y="0"/>
+          <a:ext cx="0" cy="0"/>
+          <a:chOff x="0" y="0"/>
+          <a:chExt cx="0" cy="0"/>
+        </a:xfrm>
+      </p:grpSpPr>
+      <p:sp>
+        <p:nvSpPr>
+          <p:cNvPr id="2" name="Slide Image Placeholder 1"/>
+          <p:cNvSpPr>
+            <a:spLocks noGrp="1" noRot="1" noChangeAspect="1"/>
+          </p:cNvSpPr>
+          <p:nvPr>
+            <p:ph type="sldImg"/>
+          </p:nvPr>
+        </p:nvSpPr>
+        <p:spPr/>
+      </p:sp>
+      <p:sp>
+        <p:nvSpPr>
+          <p:cNvPr id="3" name="Notes Placeholder 2"/>
+          <p:cNvSpPr>
+            <a:spLocks noGrp="1"/>
+          </p:cNvSpPr>
+          <p:nvPr>
+            <p:ph type="body" idx="1"/>
+          </p:nvPr>
+        </p:nvSpPr>
+        <p:spPr/>
+        <p:txBody>
+          <a:bodyPr/>
+          <a:lstStyle/>
+          <a:p>
+            <a:r>
+              <a:rPr lang="en-US" dirty="0"/>
+              <a:t>Mobile first :  min-width 320px // max-width 767.9px</a:t>
+            </a:r>
+          </a:p>
+          <a:p>
+            <a:r>
+              <a:rPr lang="en-US" dirty="0"/>
+              <a:t>B</a:t>
+            </a:r>
+            <a:r>
+              <a:rPr lang="en-FR" dirty="0"/>
+              <a:t>reakpoint pour tablettes &amp;&amp; desktops</a:t>
+            </a:r>
+          </a:p>
+        </p:txBody>
+      </p:sp>
+      <p:sp>
+        <p:nvSpPr>
+          <p:cNvPr id="4" name="Slide Number Placeholder 3"/>
+          <p:cNvSpPr>
+            <a:spLocks noGrp="1"/>
+          </p:cNvSpPr>
+          <p:nvPr>
+            <p:ph type="sldNum" sz="quarter" idx="5"/>
+          </p:nvPr>
+        </p:nvSpPr>
+        <p:spPr/>
+        <p:txBody>
+          <a:bodyPr/>
+          <a:lstStyle/>
+          <a:p>
+            <a:fld id="{C74514AE-876C-4849-BFE1-793BBEDE52D3}" type="slidenum">
+              <a:rPr lang="en-FR" smtClean="0"/>
+              <a:t>7</a:t>
+            </a:fld>
+            <a:endParaRPr lang="en-FR"/>
+          </a:p>
+        </p:txBody>
+      </p:sp>
+    </p:spTree>
+    <p:extLst>
+      <p:ext uri="{BB962C8B-B14F-4D97-AF65-F5344CB8AC3E}">
+        <p14:creationId xmlns:p14="http://schemas.microsoft.com/office/powerpoint/2010/main" val="4181317934"/>
+      </p:ext>
+    </p:extLst>
+  </p:cSld>
+  <p:clrMapOvr>
+    <a:masterClrMapping/>
+  </p:clrMapOvr>
+</p:notes>
+</file>
+
+<file path=ppt/notesSlides/notesSlide8.xml><?xml version="1.0" encoding="utf-8"?>
+<p:notes xmlns:a="http://schemas.openxmlformats.org/drawingml/2006/main" xmlns:r="http://schemas.openxmlformats.org/officeDocument/2006/relationships" xmlns:p="http://schemas.openxmlformats.org/presentationml/2006/main">
+  <p:cSld>
+    <p:spTree>
+      <p:nvGrpSpPr>
+        <p:cNvPr id="1" name=""/>
+        <p:cNvGrpSpPr/>
+        <p:nvPr/>
+      </p:nvGrpSpPr>
+      <p:grpSpPr>
+        <a:xfrm>
+          <a:off x="0" y="0"/>
+          <a:ext cx="0" cy="0"/>
+          <a:chOff x="0" y="0"/>
+          <a:chExt cx="0" cy="0"/>
+        </a:xfrm>
+      </p:grpSpPr>
+      <p:sp>
+        <p:nvSpPr>
+          <p:cNvPr id="2" name="Slide Image Placeholder 1"/>
+          <p:cNvSpPr>
+            <a:spLocks noGrp="1" noRot="1" noChangeAspect="1"/>
+          </p:cNvSpPr>
+          <p:nvPr>
+            <p:ph type="sldImg"/>
+          </p:nvPr>
+        </p:nvSpPr>
+        <p:spPr/>
+      </p:sp>
+      <p:sp>
+        <p:nvSpPr>
+          <p:cNvPr id="3" name="Notes Placeholder 2"/>
+          <p:cNvSpPr>
+            <a:spLocks noGrp="1"/>
+          </p:cNvSpPr>
+          <p:nvPr>
+            <p:ph type="body" idx="1"/>
+          </p:nvPr>
+        </p:nvSpPr>
+        <p:spPr/>
+        <p:txBody>
+          <a:bodyPr/>
+          <a:lstStyle/>
+          <a:p>
+            <a:r>
               <a:rPr lang="en-US" b="1" i="0" dirty="0">
                 <a:solidFill>
                   <a:srgbClr val="BCC0C3"/>
@@ -1218,18 +1630,6 @@
               </a:rPr>
               <a:t>projet</a:t>
             </a:r>
-            <a:r>
-              <a:rPr lang="en-US" b="0" i="0" dirty="0">
-                <a:solidFill>
-                  <a:srgbClr val="BDC1C6"/>
-                </a:solidFill>
-                <a:effectLst/>
-                <a:latin typeface="arial" panose="020B0604020202020204" pitchFamily="34" charset="0"/>
-              </a:rPr>
-              <a:t>.</a:t>
-            </a:r>
-          </a:p>
-          <a:p>
             <a:endParaRPr lang="en-US" b="0" i="0" dirty="0">
               <a:solidFill>
                 <a:srgbClr val="BDC1C6"/>
@@ -1239,6 +1639,15 @@
             </a:endParaRPr>
           </a:p>
           <a:p>
+            <a:endParaRPr lang="en-US" b="0" i="0" dirty="0">
+              <a:solidFill>
+                <a:srgbClr val="BDC1C6"/>
+              </a:solidFill>
+              <a:effectLst/>
+              <a:latin typeface="arial" panose="020B0604020202020204" pitchFamily="34" charset="0"/>
+            </a:endParaRPr>
+          </a:p>
+          <a:p>
             <a:r>
               <a:rPr lang="en-US" dirty="0"/>
               <a:t>G</a:t>
@@ -1441,7 +1850,7 @@
           <a:p>
             <a:fld id="{C74514AE-876C-4849-BFE1-793BBEDE52D3}" type="slidenum">
               <a:rPr lang="en-FR" smtClean="0"/>
-              <a:t>6</a:t>
+              <a:t>8</a:t>
             </a:fld>
             <a:endParaRPr lang="en-FR"/>
           </a:p>
@@ -5274,7 +5683,7 @@
           <p:cNvPr id="2" name="Title 1">
             <a:extLst>
               <a:ext uri="{FF2B5EF4-FFF2-40B4-BE49-F238E27FC236}">
-                <a16:creationId xmlns:a16="http://schemas.microsoft.com/office/drawing/2014/main" id="{F7508C9B-753F-F446-0E41-01BCF1E3096C}"/>
+                <a16:creationId xmlns:a16="http://schemas.microsoft.com/office/drawing/2014/main" id="{8A86E088-9DE6-9347-C237-C78E06F8C47D}"/>
               </a:ext>
             </a:extLst>
           </p:cNvPr>
@@ -5287,8 +5696,8 @@
         </p:nvSpPr>
         <p:spPr>
           <a:xfrm>
-            <a:off x="0" y="0"/>
-            <a:ext cx="5118652" cy="457200"/>
+            <a:off x="822961" y="304800"/>
+            <a:ext cx="4357551" cy="685800"/>
           </a:xfrm>
         </p:spPr>
         <p:txBody>
@@ -5296,1476 +5705,18 @@
           <a:lstStyle/>
           <a:p>
             <a:r>
-              <a:rPr lang="en-FR" sz="2800" dirty="0"/>
-              <a:t>Animation du coeur </a:t>
-            </a:r>
-            <a:r>
-              <a:rPr lang="en-FR" sz="1400" dirty="0"/>
-              <a:t> </a:t>
-            </a:r>
-            <a:r>
-              <a:rPr lang="en-FR" sz="1400" i="1" dirty="0"/>
-              <a:t>SASS</a:t>
-            </a:r>
-            <a:endParaRPr lang="en-FR" sz="2800" i="1" dirty="0"/>
-          </a:p>
-        </p:txBody>
-      </p:sp>
-      <p:sp>
-        <p:nvSpPr>
-          <p:cNvPr id="4" name="Text Placeholder 3">
+              <a:rPr lang="en-FR" dirty="0"/>
+              <a:t>ohmyfood</a:t>
+            </a:r>
+          </a:p>
+        </p:txBody>
+      </p:sp>
+      <p:pic>
+        <p:nvPicPr>
+          <p:cNvPr id="6" name="Content Placeholder 5" descr="A screenshot of a website&#10;&#10;Description automatically generated">
             <a:extLst>
               <a:ext uri="{FF2B5EF4-FFF2-40B4-BE49-F238E27FC236}">
-                <a16:creationId xmlns:a16="http://schemas.microsoft.com/office/drawing/2014/main" id="{47352ECD-ED86-C85C-14B4-7643CCFF949A}"/>
-              </a:ext>
-            </a:extLst>
-          </p:cNvPr>
-          <p:cNvSpPr>
-            <a:spLocks noGrp="1"/>
-          </p:cNvSpPr>
-          <p:nvPr>
-            <p:ph type="body" sz="half" idx="2"/>
-          </p:nvPr>
-        </p:nvSpPr>
-        <p:spPr>
-          <a:xfrm>
-            <a:off x="67049" y="457200"/>
-            <a:ext cx="5118652" cy="6084250"/>
-          </a:xfrm>
-          <a:solidFill>
-            <a:schemeClr val="accent3">
-              <a:lumMod val="75000"/>
-            </a:schemeClr>
-          </a:solidFill>
-        </p:spPr>
-        <p:txBody>
-          <a:bodyPr>
-            <a:noAutofit/>
-          </a:bodyPr>
-          <a:lstStyle/>
-          <a:p>
-            <a:pPr>
-              <a:spcAft>
-                <a:spcPts val="300"/>
-              </a:spcAft>
-            </a:pPr>
-            <a:r>
-              <a:rPr lang="en-US" sz="1000" b="0" dirty="0">
-                <a:solidFill>
-                  <a:srgbClr val="79C0FF"/>
-                </a:solidFill>
-                <a:effectLst/>
-                <a:latin typeface="Menlo" panose="020B0609030804020204" pitchFamily="49" charset="0"/>
-              </a:rPr>
-              <a:t>#</a:t>
-            </a:r>
-            <a:r>
-              <a:rPr lang="en-US" sz="1000" b="0" dirty="0" err="1">
-                <a:solidFill>
-                  <a:srgbClr val="79C0FF"/>
-                </a:solidFill>
-                <a:effectLst/>
-                <a:latin typeface="Menlo" panose="020B0609030804020204" pitchFamily="49" charset="0"/>
-              </a:rPr>
-              <a:t>toggle-heart:checked</a:t>
-            </a:r>
-            <a:r>
-              <a:rPr lang="en-US" sz="1000" b="0" dirty="0">
-                <a:solidFill>
-                  <a:srgbClr val="E6EDF3"/>
-                </a:solidFill>
-                <a:effectLst/>
-                <a:latin typeface="Menlo" panose="020B0609030804020204" pitchFamily="49" charset="0"/>
-              </a:rPr>
-              <a:t> + </a:t>
-            </a:r>
-            <a:r>
-              <a:rPr lang="en-US" sz="1000" b="0" dirty="0">
-                <a:solidFill>
-                  <a:srgbClr val="79C0FF"/>
-                </a:solidFill>
-                <a:effectLst/>
-                <a:latin typeface="Menlo" panose="020B0609030804020204" pitchFamily="49" charset="0"/>
-              </a:rPr>
-              <a:t>.homepage-heart</a:t>
-            </a:r>
-            <a:r>
-              <a:rPr lang="en-US" sz="1000" b="0" dirty="0">
-                <a:solidFill>
-                  <a:srgbClr val="E6EDF3"/>
-                </a:solidFill>
-                <a:effectLst/>
-                <a:latin typeface="Menlo" panose="020B0609030804020204" pitchFamily="49" charset="0"/>
-              </a:rPr>
-              <a:t>,</a:t>
-            </a:r>
-          </a:p>
-          <a:p>
-            <a:pPr>
-              <a:spcAft>
-                <a:spcPts val="300"/>
-              </a:spcAft>
-            </a:pPr>
-            <a:r>
-              <a:rPr lang="en-US" sz="1000" b="0" dirty="0">
-                <a:solidFill>
-                  <a:srgbClr val="79C0FF"/>
-                </a:solidFill>
-                <a:effectLst/>
-                <a:latin typeface="Menlo" panose="020B0609030804020204" pitchFamily="49" charset="0"/>
-              </a:rPr>
-              <a:t>#</a:t>
-            </a:r>
-            <a:r>
-              <a:rPr lang="en-US" sz="1000" b="0" dirty="0" err="1">
-                <a:solidFill>
-                  <a:srgbClr val="79C0FF"/>
-                </a:solidFill>
-                <a:effectLst/>
-                <a:latin typeface="Menlo" panose="020B0609030804020204" pitchFamily="49" charset="0"/>
-              </a:rPr>
-              <a:t>toggle-heart:checked</a:t>
-            </a:r>
-            <a:r>
-              <a:rPr lang="en-US" sz="1000" b="0" dirty="0">
-                <a:solidFill>
-                  <a:srgbClr val="E6EDF3"/>
-                </a:solidFill>
-                <a:effectLst/>
-                <a:latin typeface="Menlo" panose="020B0609030804020204" pitchFamily="49" charset="0"/>
-              </a:rPr>
-              <a:t> + </a:t>
-            </a:r>
-            <a:r>
-              <a:rPr lang="en-US" sz="1000" b="0" dirty="0">
-                <a:solidFill>
-                  <a:srgbClr val="79C0FF"/>
-                </a:solidFill>
-                <a:effectLst/>
-                <a:latin typeface="Menlo" panose="020B0609030804020204" pitchFamily="49" charset="0"/>
-              </a:rPr>
-              <a:t>.secondary-page-heart</a:t>
-            </a:r>
-            <a:r>
-              <a:rPr lang="en-US" sz="1000" b="0" dirty="0">
-                <a:solidFill>
-                  <a:srgbClr val="E6EDF3"/>
-                </a:solidFill>
-                <a:effectLst/>
-                <a:latin typeface="Menlo" panose="020B0609030804020204" pitchFamily="49" charset="0"/>
-              </a:rPr>
-              <a:t>,</a:t>
-            </a:r>
-          </a:p>
-          <a:p>
-            <a:pPr>
-              <a:spcAft>
-                <a:spcPts val="300"/>
-              </a:spcAft>
-            </a:pPr>
-            <a:r>
-              <a:rPr lang="en-US" sz="1000" b="0" dirty="0">
-                <a:solidFill>
-                  <a:srgbClr val="79C0FF"/>
-                </a:solidFill>
-                <a:effectLst/>
-                <a:latin typeface="Menlo" panose="020B0609030804020204" pitchFamily="49" charset="0"/>
-              </a:rPr>
-              <a:t>#toggle-heart2:checked</a:t>
-            </a:r>
-            <a:r>
-              <a:rPr lang="en-US" sz="1000" b="0" dirty="0">
-                <a:solidFill>
-                  <a:srgbClr val="E6EDF3"/>
-                </a:solidFill>
-                <a:effectLst/>
-                <a:latin typeface="Menlo" panose="020B0609030804020204" pitchFamily="49" charset="0"/>
-              </a:rPr>
-              <a:t> + </a:t>
-            </a:r>
-            <a:r>
-              <a:rPr lang="en-US" sz="1000" b="0" dirty="0">
-                <a:solidFill>
-                  <a:srgbClr val="79C0FF"/>
-                </a:solidFill>
-                <a:effectLst/>
-                <a:latin typeface="Menlo" panose="020B0609030804020204" pitchFamily="49" charset="0"/>
-              </a:rPr>
-              <a:t>.homepage-heart</a:t>
-            </a:r>
-            <a:r>
-              <a:rPr lang="en-US" sz="1000" b="0" dirty="0">
-                <a:solidFill>
-                  <a:srgbClr val="E6EDF3"/>
-                </a:solidFill>
-                <a:effectLst/>
-                <a:latin typeface="Menlo" panose="020B0609030804020204" pitchFamily="49" charset="0"/>
-              </a:rPr>
-              <a:t>,</a:t>
-            </a:r>
-          </a:p>
-          <a:p>
-            <a:pPr>
-              <a:spcAft>
-                <a:spcPts val="300"/>
-              </a:spcAft>
-            </a:pPr>
-            <a:r>
-              <a:rPr lang="en-US" sz="1000" b="0" dirty="0">
-                <a:solidFill>
-                  <a:srgbClr val="79C0FF"/>
-                </a:solidFill>
-                <a:effectLst/>
-                <a:latin typeface="Menlo" panose="020B0609030804020204" pitchFamily="49" charset="0"/>
-              </a:rPr>
-              <a:t>#toggle-heart2:checked</a:t>
-            </a:r>
-            <a:r>
-              <a:rPr lang="en-US" sz="1000" b="0" dirty="0">
-                <a:solidFill>
-                  <a:srgbClr val="E6EDF3"/>
-                </a:solidFill>
-                <a:effectLst/>
-                <a:latin typeface="Menlo" panose="020B0609030804020204" pitchFamily="49" charset="0"/>
-              </a:rPr>
-              <a:t> + </a:t>
-            </a:r>
-            <a:r>
-              <a:rPr lang="en-US" sz="1000" b="0" dirty="0">
-                <a:solidFill>
-                  <a:srgbClr val="79C0FF"/>
-                </a:solidFill>
-                <a:effectLst/>
-                <a:latin typeface="Menlo" panose="020B0609030804020204" pitchFamily="49" charset="0"/>
-              </a:rPr>
-              <a:t>.secondary-page-heart</a:t>
-            </a:r>
-            <a:r>
-              <a:rPr lang="en-US" sz="1000" b="0" dirty="0">
-                <a:solidFill>
-                  <a:srgbClr val="E6EDF3"/>
-                </a:solidFill>
-                <a:effectLst/>
-                <a:latin typeface="Menlo" panose="020B0609030804020204" pitchFamily="49" charset="0"/>
-              </a:rPr>
-              <a:t>,</a:t>
-            </a:r>
-          </a:p>
-          <a:p>
-            <a:pPr>
-              <a:spcAft>
-                <a:spcPts val="300"/>
-              </a:spcAft>
-            </a:pPr>
-            <a:r>
-              <a:rPr lang="en-US" sz="1000" b="0" dirty="0">
-                <a:solidFill>
-                  <a:srgbClr val="79C0FF"/>
-                </a:solidFill>
-                <a:effectLst/>
-                <a:latin typeface="Menlo" panose="020B0609030804020204" pitchFamily="49" charset="0"/>
-              </a:rPr>
-              <a:t>#toggle-heart3:checked</a:t>
-            </a:r>
-            <a:r>
-              <a:rPr lang="en-US" sz="1000" b="0" dirty="0">
-                <a:solidFill>
-                  <a:srgbClr val="E6EDF3"/>
-                </a:solidFill>
-                <a:effectLst/>
-                <a:latin typeface="Menlo" panose="020B0609030804020204" pitchFamily="49" charset="0"/>
-              </a:rPr>
-              <a:t> + </a:t>
-            </a:r>
-            <a:r>
-              <a:rPr lang="en-US" sz="1000" b="0" dirty="0">
-                <a:solidFill>
-                  <a:srgbClr val="79C0FF"/>
-                </a:solidFill>
-                <a:effectLst/>
-                <a:latin typeface="Menlo" panose="020B0609030804020204" pitchFamily="49" charset="0"/>
-              </a:rPr>
-              <a:t>.homepage-heart</a:t>
-            </a:r>
-            <a:r>
-              <a:rPr lang="en-US" sz="1000" b="0" dirty="0">
-                <a:solidFill>
-                  <a:srgbClr val="E6EDF3"/>
-                </a:solidFill>
-                <a:effectLst/>
-                <a:latin typeface="Menlo" panose="020B0609030804020204" pitchFamily="49" charset="0"/>
-              </a:rPr>
-              <a:t>,</a:t>
-            </a:r>
-          </a:p>
-          <a:p>
-            <a:pPr>
-              <a:spcAft>
-                <a:spcPts val="300"/>
-              </a:spcAft>
-            </a:pPr>
-            <a:r>
-              <a:rPr lang="en-US" sz="1000" b="0" dirty="0">
-                <a:solidFill>
-                  <a:srgbClr val="79C0FF"/>
-                </a:solidFill>
-                <a:effectLst/>
-                <a:latin typeface="Menlo" panose="020B0609030804020204" pitchFamily="49" charset="0"/>
-              </a:rPr>
-              <a:t>#toggle-heart3:checked</a:t>
-            </a:r>
-            <a:r>
-              <a:rPr lang="en-US" sz="1000" b="0" dirty="0">
-                <a:solidFill>
-                  <a:srgbClr val="E6EDF3"/>
-                </a:solidFill>
-                <a:effectLst/>
-                <a:latin typeface="Menlo" panose="020B0609030804020204" pitchFamily="49" charset="0"/>
-              </a:rPr>
-              <a:t> + </a:t>
-            </a:r>
-            <a:r>
-              <a:rPr lang="en-US" sz="1000" b="0" dirty="0">
-                <a:solidFill>
-                  <a:srgbClr val="79C0FF"/>
-                </a:solidFill>
-                <a:effectLst/>
-                <a:latin typeface="Menlo" panose="020B0609030804020204" pitchFamily="49" charset="0"/>
-              </a:rPr>
-              <a:t>.secondary-page-heart</a:t>
-            </a:r>
-            <a:r>
-              <a:rPr lang="en-US" sz="1000" b="0" dirty="0">
-                <a:solidFill>
-                  <a:srgbClr val="E6EDF3"/>
-                </a:solidFill>
-                <a:effectLst/>
-                <a:latin typeface="Menlo" panose="020B0609030804020204" pitchFamily="49" charset="0"/>
-              </a:rPr>
-              <a:t>,</a:t>
-            </a:r>
-          </a:p>
-          <a:p>
-            <a:pPr>
-              <a:spcAft>
-                <a:spcPts val="300"/>
-              </a:spcAft>
-            </a:pPr>
-            <a:r>
-              <a:rPr lang="en-US" sz="1000" b="0" dirty="0">
-                <a:solidFill>
-                  <a:srgbClr val="79C0FF"/>
-                </a:solidFill>
-                <a:effectLst/>
-                <a:latin typeface="Menlo" panose="020B0609030804020204" pitchFamily="49" charset="0"/>
-              </a:rPr>
-              <a:t>#toggle-heart4:checked</a:t>
-            </a:r>
-            <a:r>
-              <a:rPr lang="en-US" sz="1000" b="0" dirty="0">
-                <a:solidFill>
-                  <a:srgbClr val="E6EDF3"/>
-                </a:solidFill>
-                <a:effectLst/>
-                <a:latin typeface="Menlo" panose="020B0609030804020204" pitchFamily="49" charset="0"/>
-              </a:rPr>
-              <a:t> + </a:t>
-            </a:r>
-            <a:r>
-              <a:rPr lang="en-US" sz="1000" b="0" dirty="0">
-                <a:solidFill>
-                  <a:srgbClr val="79C0FF"/>
-                </a:solidFill>
-                <a:effectLst/>
-                <a:latin typeface="Menlo" panose="020B0609030804020204" pitchFamily="49" charset="0"/>
-              </a:rPr>
-              <a:t>.homepage-heart</a:t>
-            </a:r>
-            <a:r>
-              <a:rPr lang="en-US" sz="1000" b="0" dirty="0">
-                <a:solidFill>
-                  <a:srgbClr val="E6EDF3"/>
-                </a:solidFill>
-                <a:effectLst/>
-                <a:latin typeface="Menlo" panose="020B0609030804020204" pitchFamily="49" charset="0"/>
-              </a:rPr>
-              <a:t>,</a:t>
-            </a:r>
-          </a:p>
-          <a:p>
-            <a:pPr>
-              <a:spcAft>
-                <a:spcPts val="300"/>
-              </a:spcAft>
-            </a:pPr>
-            <a:r>
-              <a:rPr lang="en-US" sz="1000" b="0" dirty="0">
-                <a:solidFill>
-                  <a:srgbClr val="79C0FF"/>
-                </a:solidFill>
-                <a:effectLst/>
-                <a:latin typeface="Menlo" panose="020B0609030804020204" pitchFamily="49" charset="0"/>
-              </a:rPr>
-              <a:t>#toggle-heart4:checked</a:t>
-            </a:r>
-            <a:r>
-              <a:rPr lang="en-US" sz="1000" b="0" dirty="0">
-                <a:solidFill>
-                  <a:srgbClr val="E6EDF3"/>
-                </a:solidFill>
-                <a:effectLst/>
-                <a:latin typeface="Menlo" panose="020B0609030804020204" pitchFamily="49" charset="0"/>
-              </a:rPr>
-              <a:t> + </a:t>
-            </a:r>
-            <a:r>
-              <a:rPr lang="en-US" sz="1000" b="0" dirty="0">
-                <a:solidFill>
-                  <a:srgbClr val="79C0FF"/>
-                </a:solidFill>
-                <a:effectLst/>
-                <a:latin typeface="Menlo" panose="020B0609030804020204" pitchFamily="49" charset="0"/>
-              </a:rPr>
-              <a:t>.secondary-page-heart</a:t>
-            </a:r>
-            <a:r>
-              <a:rPr lang="en-US" sz="1000" b="0" dirty="0">
-                <a:solidFill>
-                  <a:srgbClr val="E6EDF3"/>
-                </a:solidFill>
-                <a:effectLst/>
-                <a:latin typeface="Menlo" panose="020B0609030804020204" pitchFamily="49" charset="0"/>
-              </a:rPr>
-              <a:t> {</a:t>
-            </a:r>
-          </a:p>
-          <a:p>
-            <a:pPr>
-              <a:spcAft>
-                <a:spcPts val="300"/>
-              </a:spcAft>
-            </a:pPr>
-            <a:r>
-              <a:rPr lang="en-US" sz="1000" b="0" dirty="0">
-                <a:solidFill>
-                  <a:srgbClr val="79C0FF"/>
-                </a:solidFill>
-                <a:effectLst/>
-                <a:latin typeface="Menlo" panose="020B0609030804020204" pitchFamily="49" charset="0"/>
-              </a:rPr>
-              <a:t>background-image</a:t>
-            </a:r>
-            <a:r>
-              <a:rPr lang="en-US" sz="1000" b="0" dirty="0">
-                <a:solidFill>
-                  <a:srgbClr val="E6EDF3"/>
-                </a:solidFill>
-                <a:effectLst/>
-                <a:latin typeface="Menlo" panose="020B0609030804020204" pitchFamily="49" charset="0"/>
-              </a:rPr>
-              <a:t>: </a:t>
-            </a:r>
-            <a:r>
-              <a:rPr lang="en-US" sz="1000" b="0" dirty="0" err="1">
-                <a:solidFill>
-                  <a:srgbClr val="79C0FF"/>
-                </a:solidFill>
-                <a:effectLst/>
-                <a:latin typeface="Menlo" panose="020B0609030804020204" pitchFamily="49" charset="0"/>
-              </a:rPr>
-              <a:t>url</a:t>
-            </a:r>
-            <a:r>
-              <a:rPr lang="en-US" sz="1000" b="0" dirty="0">
-                <a:solidFill>
-                  <a:srgbClr val="E6EDF3"/>
-                </a:solidFill>
-                <a:effectLst/>
-                <a:latin typeface="Menlo" panose="020B0609030804020204" pitchFamily="49" charset="0"/>
-              </a:rPr>
-              <a:t>(</a:t>
-            </a:r>
-            <a:r>
-              <a:rPr lang="en-US" sz="1000" b="0" dirty="0">
-                <a:solidFill>
-                  <a:srgbClr val="FFA657"/>
-                </a:solidFill>
-                <a:effectLst/>
-                <a:latin typeface="Menlo" panose="020B0609030804020204" pitchFamily="49" charset="0"/>
-              </a:rPr>
-              <a:t>../Assets/Status=</a:t>
-            </a:r>
-            <a:r>
-              <a:rPr lang="en-US" sz="1000" b="0" dirty="0" err="1">
-                <a:solidFill>
-                  <a:srgbClr val="FFA657"/>
-                </a:solidFill>
-                <a:effectLst/>
-                <a:latin typeface="Menlo" panose="020B0609030804020204" pitchFamily="49" charset="0"/>
-              </a:rPr>
-              <a:t>Liked.svg</a:t>
-            </a:r>
-            <a:r>
-              <a:rPr lang="en-US" sz="1000" b="0" dirty="0">
-                <a:solidFill>
-                  <a:srgbClr val="E6EDF3"/>
-                </a:solidFill>
-                <a:effectLst/>
-                <a:latin typeface="Menlo" panose="020B0609030804020204" pitchFamily="49" charset="0"/>
-              </a:rPr>
-              <a:t>);</a:t>
-            </a:r>
-          </a:p>
-          <a:p>
-            <a:pPr>
-              <a:spcAft>
-                <a:spcPts val="300"/>
-              </a:spcAft>
-            </a:pPr>
-            <a:r>
-              <a:rPr lang="en-US" sz="1000" b="0" dirty="0">
-                <a:solidFill>
-                  <a:srgbClr val="79C0FF"/>
-                </a:solidFill>
-                <a:effectLst/>
-                <a:latin typeface="Menlo" panose="020B0609030804020204" pitchFamily="49" charset="0"/>
-              </a:rPr>
-              <a:t>transition-duration</a:t>
-            </a:r>
-            <a:r>
-              <a:rPr lang="en-US" sz="1000" b="0" dirty="0">
-                <a:solidFill>
-                  <a:srgbClr val="E6EDF3"/>
-                </a:solidFill>
-                <a:effectLst/>
-                <a:latin typeface="Menlo" panose="020B0609030804020204" pitchFamily="49" charset="0"/>
-              </a:rPr>
-              <a:t>: </a:t>
-            </a:r>
-            <a:r>
-              <a:rPr lang="en-US" sz="1000" b="0" dirty="0">
-                <a:solidFill>
-                  <a:srgbClr val="79C0FF"/>
-                </a:solidFill>
-                <a:effectLst/>
-                <a:latin typeface="Menlo" panose="020B0609030804020204" pitchFamily="49" charset="0"/>
-              </a:rPr>
-              <a:t>1</a:t>
-            </a:r>
-            <a:r>
-              <a:rPr lang="en-US" sz="1000" b="0" dirty="0">
-                <a:solidFill>
-                  <a:srgbClr val="FF7B72"/>
-                </a:solidFill>
-                <a:effectLst/>
-                <a:latin typeface="Menlo" panose="020B0609030804020204" pitchFamily="49" charset="0"/>
-              </a:rPr>
-              <a:t>s</a:t>
-            </a:r>
-            <a:r>
-              <a:rPr lang="en-US" sz="1000" b="0" dirty="0">
-                <a:solidFill>
-                  <a:srgbClr val="E6EDF3"/>
-                </a:solidFill>
-                <a:effectLst/>
-                <a:latin typeface="Menlo" panose="020B0609030804020204" pitchFamily="49" charset="0"/>
-              </a:rPr>
-              <a:t>;</a:t>
-            </a:r>
-          </a:p>
-          <a:p>
-            <a:pPr>
-              <a:spcAft>
-                <a:spcPts val="300"/>
-              </a:spcAft>
-            </a:pPr>
-            <a:r>
-              <a:rPr lang="en-US" sz="1000" b="0" dirty="0">
-                <a:solidFill>
-                  <a:srgbClr val="7EE787"/>
-                </a:solidFill>
-                <a:effectLst/>
-                <a:latin typeface="Menlo" panose="020B0609030804020204" pitchFamily="49" charset="0"/>
-              </a:rPr>
-              <a:t>&amp;</a:t>
-            </a:r>
-            <a:r>
-              <a:rPr lang="en-US" sz="1000" b="0" dirty="0">
-                <a:solidFill>
-                  <a:srgbClr val="79C0FF"/>
-                </a:solidFill>
-                <a:effectLst/>
-                <a:latin typeface="Menlo" panose="020B0609030804020204" pitchFamily="49" charset="0"/>
-              </a:rPr>
-              <a:t>:hover</a:t>
-            </a:r>
-            <a:r>
-              <a:rPr lang="en-US" sz="1000" b="0" dirty="0">
-                <a:solidFill>
-                  <a:srgbClr val="E6EDF3"/>
-                </a:solidFill>
-                <a:effectLst/>
-                <a:latin typeface="Menlo" panose="020B0609030804020204" pitchFamily="49" charset="0"/>
-              </a:rPr>
-              <a:t> {</a:t>
-            </a:r>
-          </a:p>
-          <a:p>
-            <a:pPr>
-              <a:spcAft>
-                <a:spcPts val="300"/>
-              </a:spcAft>
-            </a:pPr>
-            <a:r>
-              <a:rPr lang="en-US" sz="1000" b="0" dirty="0">
-                <a:solidFill>
-                  <a:srgbClr val="79C0FF"/>
-                </a:solidFill>
-                <a:effectLst/>
-                <a:latin typeface="Menlo" panose="020B0609030804020204" pitchFamily="49" charset="0"/>
-              </a:rPr>
-              <a:t>transform</a:t>
-            </a:r>
-            <a:r>
-              <a:rPr lang="en-US" sz="1000" b="0" dirty="0">
-                <a:solidFill>
-                  <a:srgbClr val="E6EDF3"/>
-                </a:solidFill>
-                <a:effectLst/>
-                <a:latin typeface="Menlo" panose="020B0609030804020204" pitchFamily="49" charset="0"/>
-              </a:rPr>
-              <a:t>: </a:t>
-            </a:r>
-            <a:r>
-              <a:rPr lang="en-US" sz="1000" b="0" dirty="0">
-                <a:solidFill>
-                  <a:srgbClr val="79C0FF"/>
-                </a:solidFill>
-                <a:effectLst/>
-                <a:latin typeface="Menlo" panose="020B0609030804020204" pitchFamily="49" charset="0"/>
-              </a:rPr>
-              <a:t>scale</a:t>
-            </a:r>
-            <a:r>
-              <a:rPr lang="en-US" sz="1000" b="0" dirty="0">
-                <a:solidFill>
-                  <a:srgbClr val="E6EDF3"/>
-                </a:solidFill>
-                <a:effectLst/>
-                <a:latin typeface="Menlo" panose="020B0609030804020204" pitchFamily="49" charset="0"/>
-              </a:rPr>
-              <a:t>(</a:t>
-            </a:r>
-            <a:r>
-              <a:rPr lang="en-US" sz="1000" b="0" dirty="0">
-                <a:solidFill>
-                  <a:srgbClr val="79C0FF"/>
-                </a:solidFill>
-                <a:effectLst/>
-                <a:latin typeface="Menlo" panose="020B0609030804020204" pitchFamily="49" charset="0"/>
-              </a:rPr>
-              <a:t>1.3</a:t>
-            </a:r>
-            <a:r>
-              <a:rPr lang="en-US" sz="1000" b="0" dirty="0">
-                <a:solidFill>
-                  <a:srgbClr val="E6EDF3"/>
-                </a:solidFill>
-                <a:effectLst/>
-                <a:latin typeface="Menlo" panose="020B0609030804020204" pitchFamily="49" charset="0"/>
-              </a:rPr>
-              <a:t>);</a:t>
-            </a:r>
-          </a:p>
-          <a:p>
-            <a:pPr>
-              <a:spcAft>
-                <a:spcPts val="300"/>
-              </a:spcAft>
-            </a:pPr>
-            <a:r>
-              <a:rPr lang="en-US" sz="1000" b="0" dirty="0">
-                <a:solidFill>
-                  <a:srgbClr val="79C0FF"/>
-                </a:solidFill>
-                <a:effectLst/>
-                <a:latin typeface="Menlo" panose="020B0609030804020204" pitchFamily="49" charset="0"/>
-              </a:rPr>
-              <a:t>transition</a:t>
-            </a:r>
-            <a:r>
-              <a:rPr lang="en-US" sz="1000" b="0" dirty="0">
-                <a:solidFill>
-                  <a:srgbClr val="E6EDF3"/>
-                </a:solidFill>
-                <a:effectLst/>
-                <a:latin typeface="Menlo" panose="020B0609030804020204" pitchFamily="49" charset="0"/>
-              </a:rPr>
-              <a:t>: </a:t>
-            </a:r>
-            <a:r>
-              <a:rPr lang="en-US" sz="1000" b="0" dirty="0">
-                <a:solidFill>
-                  <a:srgbClr val="79C0FF"/>
-                </a:solidFill>
-                <a:effectLst/>
-                <a:latin typeface="Menlo" panose="020B0609030804020204" pitchFamily="49" charset="0"/>
-              </a:rPr>
-              <a:t>all</a:t>
-            </a:r>
-            <a:r>
-              <a:rPr lang="en-US" sz="1000" b="0" dirty="0">
-                <a:solidFill>
-                  <a:srgbClr val="E6EDF3"/>
-                </a:solidFill>
-                <a:effectLst/>
-                <a:latin typeface="Menlo" panose="020B0609030804020204" pitchFamily="49" charset="0"/>
-              </a:rPr>
-              <a:t> </a:t>
-            </a:r>
-            <a:r>
-              <a:rPr lang="en-US" sz="1000" b="0" dirty="0">
-                <a:solidFill>
-                  <a:srgbClr val="79C0FF"/>
-                </a:solidFill>
-                <a:effectLst/>
-                <a:latin typeface="Menlo" panose="020B0609030804020204" pitchFamily="49" charset="0"/>
-              </a:rPr>
-              <a:t>1</a:t>
-            </a:r>
-            <a:r>
-              <a:rPr lang="en-US" sz="1000" b="0" dirty="0">
-                <a:solidFill>
-                  <a:srgbClr val="FF7B72"/>
-                </a:solidFill>
-                <a:effectLst/>
-                <a:latin typeface="Menlo" panose="020B0609030804020204" pitchFamily="49" charset="0"/>
-              </a:rPr>
-              <a:t>s</a:t>
-            </a:r>
-            <a:r>
-              <a:rPr lang="en-US" sz="1000" b="0" dirty="0">
-                <a:solidFill>
-                  <a:srgbClr val="E6EDF3"/>
-                </a:solidFill>
-                <a:effectLst/>
-                <a:latin typeface="Menlo" panose="020B0609030804020204" pitchFamily="49" charset="0"/>
-              </a:rPr>
-              <a:t>;</a:t>
-            </a:r>
-          </a:p>
-          <a:p>
-            <a:pPr>
-              <a:spcAft>
-                <a:spcPts val="300"/>
-              </a:spcAft>
-            </a:pPr>
-            <a:r>
-              <a:rPr lang="en-US" sz="1000" b="0" dirty="0">
-                <a:solidFill>
-                  <a:srgbClr val="E6EDF3"/>
-                </a:solidFill>
-                <a:effectLst/>
-                <a:latin typeface="Menlo" panose="020B0609030804020204" pitchFamily="49" charset="0"/>
-              </a:rPr>
-              <a:t>}</a:t>
-            </a:r>
-          </a:p>
-          <a:p>
-            <a:pPr>
-              <a:spcAft>
-                <a:spcPts val="300"/>
-              </a:spcAft>
-            </a:pPr>
-            <a:r>
-              <a:rPr lang="en-US" sz="1000" b="0" dirty="0">
-                <a:solidFill>
-                  <a:srgbClr val="E6EDF3"/>
-                </a:solidFill>
-                <a:effectLst/>
-                <a:latin typeface="Menlo" panose="020B0609030804020204" pitchFamily="49" charset="0"/>
-              </a:rPr>
-              <a:t>}</a:t>
-            </a:r>
-            <a:br>
-              <a:rPr lang="en-US" sz="1000" b="0" dirty="0">
-                <a:solidFill>
-                  <a:srgbClr val="E6EDF3"/>
-                </a:solidFill>
-                <a:effectLst/>
-                <a:latin typeface="Menlo" panose="020B0609030804020204" pitchFamily="49" charset="0"/>
-              </a:rPr>
-            </a:br>
-            <a:r>
-              <a:rPr lang="en-US" sz="1000" b="0" dirty="0">
-                <a:solidFill>
-                  <a:srgbClr val="79C0FF"/>
-                </a:solidFill>
-                <a:effectLst/>
-                <a:latin typeface="Menlo" panose="020B0609030804020204" pitchFamily="49" charset="0"/>
-              </a:rPr>
-              <a:t>#toggle-heart</a:t>
-            </a:r>
-            <a:r>
-              <a:rPr lang="en-US" sz="1000" b="0" dirty="0">
-                <a:solidFill>
-                  <a:srgbClr val="E6EDF3"/>
-                </a:solidFill>
-                <a:effectLst/>
-                <a:latin typeface="Menlo" panose="020B0609030804020204" pitchFamily="49" charset="0"/>
-              </a:rPr>
-              <a:t> + </a:t>
-            </a:r>
-            <a:r>
-              <a:rPr lang="en-US" sz="1000" b="0" dirty="0">
-                <a:solidFill>
-                  <a:srgbClr val="79C0FF"/>
-                </a:solidFill>
-                <a:effectLst/>
-                <a:latin typeface="Menlo" panose="020B0609030804020204" pitchFamily="49" charset="0"/>
-              </a:rPr>
-              <a:t>.secondary-page-heart</a:t>
-            </a:r>
-            <a:r>
-              <a:rPr lang="en-US" sz="1000" b="0" dirty="0">
-                <a:solidFill>
-                  <a:srgbClr val="E6EDF3"/>
-                </a:solidFill>
-                <a:effectLst/>
-                <a:latin typeface="Menlo" panose="020B0609030804020204" pitchFamily="49" charset="0"/>
-              </a:rPr>
-              <a:t>,</a:t>
-            </a:r>
-          </a:p>
-          <a:p>
-            <a:pPr>
-              <a:spcAft>
-                <a:spcPts val="300"/>
-              </a:spcAft>
-            </a:pPr>
-            <a:r>
-              <a:rPr lang="en-US" sz="1000" b="0" dirty="0">
-                <a:solidFill>
-                  <a:srgbClr val="79C0FF"/>
-                </a:solidFill>
-                <a:effectLst/>
-                <a:latin typeface="Menlo" panose="020B0609030804020204" pitchFamily="49" charset="0"/>
-              </a:rPr>
-              <a:t>#toggle-heart</a:t>
-            </a:r>
-            <a:r>
-              <a:rPr lang="en-US" sz="1000" b="0" dirty="0">
-                <a:solidFill>
-                  <a:srgbClr val="E6EDF3"/>
-                </a:solidFill>
-                <a:effectLst/>
-                <a:latin typeface="Menlo" panose="020B0609030804020204" pitchFamily="49" charset="0"/>
-              </a:rPr>
-              <a:t> + </a:t>
-            </a:r>
-            <a:r>
-              <a:rPr lang="en-US" sz="1000" b="0" dirty="0">
-                <a:solidFill>
-                  <a:srgbClr val="79C0FF"/>
-                </a:solidFill>
-                <a:effectLst/>
-                <a:latin typeface="Menlo" panose="020B0609030804020204" pitchFamily="49" charset="0"/>
-              </a:rPr>
-              <a:t>.homepage-heart</a:t>
-            </a:r>
-            <a:r>
-              <a:rPr lang="en-US" sz="1000" b="0" dirty="0">
-                <a:solidFill>
-                  <a:srgbClr val="E6EDF3"/>
-                </a:solidFill>
-                <a:effectLst/>
-                <a:latin typeface="Menlo" panose="020B0609030804020204" pitchFamily="49" charset="0"/>
-              </a:rPr>
-              <a:t>,</a:t>
-            </a:r>
-          </a:p>
-          <a:p>
-            <a:pPr>
-              <a:spcAft>
-                <a:spcPts val="300"/>
-              </a:spcAft>
-            </a:pPr>
-            <a:r>
-              <a:rPr lang="en-US" sz="1000" b="0" dirty="0">
-                <a:solidFill>
-                  <a:srgbClr val="79C0FF"/>
-                </a:solidFill>
-                <a:effectLst/>
-                <a:latin typeface="Menlo" panose="020B0609030804020204" pitchFamily="49" charset="0"/>
-              </a:rPr>
-              <a:t>#toggle-heart2</a:t>
-            </a:r>
-            <a:r>
-              <a:rPr lang="en-US" sz="1000" b="0" dirty="0">
-                <a:solidFill>
-                  <a:srgbClr val="E6EDF3"/>
-                </a:solidFill>
-                <a:effectLst/>
-                <a:latin typeface="Menlo" panose="020B0609030804020204" pitchFamily="49" charset="0"/>
-              </a:rPr>
-              <a:t> + </a:t>
-            </a:r>
-            <a:r>
-              <a:rPr lang="en-US" sz="1000" b="0" dirty="0">
-                <a:solidFill>
-                  <a:srgbClr val="79C0FF"/>
-                </a:solidFill>
-                <a:effectLst/>
-                <a:latin typeface="Menlo" panose="020B0609030804020204" pitchFamily="49" charset="0"/>
-              </a:rPr>
-              <a:t>.secondary-page-heart</a:t>
-            </a:r>
-            <a:r>
-              <a:rPr lang="en-US" sz="1000" b="0" dirty="0">
-                <a:solidFill>
-                  <a:srgbClr val="E6EDF3"/>
-                </a:solidFill>
-                <a:effectLst/>
-                <a:latin typeface="Menlo" panose="020B0609030804020204" pitchFamily="49" charset="0"/>
-              </a:rPr>
-              <a:t>,</a:t>
-            </a:r>
-          </a:p>
-          <a:p>
-            <a:pPr>
-              <a:spcAft>
-                <a:spcPts val="300"/>
-              </a:spcAft>
-            </a:pPr>
-            <a:r>
-              <a:rPr lang="en-US" sz="1000" b="0" dirty="0">
-                <a:solidFill>
-                  <a:srgbClr val="79C0FF"/>
-                </a:solidFill>
-                <a:effectLst/>
-                <a:latin typeface="Menlo" panose="020B0609030804020204" pitchFamily="49" charset="0"/>
-              </a:rPr>
-              <a:t>#toggle-heart2</a:t>
-            </a:r>
-            <a:r>
-              <a:rPr lang="en-US" sz="1000" b="0" dirty="0">
-                <a:solidFill>
-                  <a:srgbClr val="E6EDF3"/>
-                </a:solidFill>
-                <a:effectLst/>
-                <a:latin typeface="Menlo" panose="020B0609030804020204" pitchFamily="49" charset="0"/>
-              </a:rPr>
-              <a:t> + </a:t>
-            </a:r>
-            <a:r>
-              <a:rPr lang="en-US" sz="1000" b="0" dirty="0">
-                <a:solidFill>
-                  <a:srgbClr val="79C0FF"/>
-                </a:solidFill>
-                <a:effectLst/>
-                <a:latin typeface="Menlo" panose="020B0609030804020204" pitchFamily="49" charset="0"/>
-              </a:rPr>
-              <a:t>.homepage-heart</a:t>
-            </a:r>
-            <a:r>
-              <a:rPr lang="en-US" sz="1000" b="0" dirty="0">
-                <a:solidFill>
-                  <a:srgbClr val="E6EDF3"/>
-                </a:solidFill>
-                <a:effectLst/>
-                <a:latin typeface="Menlo" panose="020B0609030804020204" pitchFamily="49" charset="0"/>
-              </a:rPr>
-              <a:t>,</a:t>
-            </a:r>
-          </a:p>
-          <a:p>
-            <a:pPr>
-              <a:spcAft>
-                <a:spcPts val="300"/>
-              </a:spcAft>
-            </a:pPr>
-            <a:r>
-              <a:rPr lang="en-US" sz="1000" b="0" dirty="0">
-                <a:solidFill>
-                  <a:srgbClr val="79C0FF"/>
-                </a:solidFill>
-                <a:effectLst/>
-                <a:latin typeface="Menlo" panose="020B0609030804020204" pitchFamily="49" charset="0"/>
-              </a:rPr>
-              <a:t>#toggle-heart3</a:t>
-            </a:r>
-            <a:r>
-              <a:rPr lang="en-US" sz="1000" b="0" dirty="0">
-                <a:solidFill>
-                  <a:srgbClr val="E6EDF3"/>
-                </a:solidFill>
-                <a:effectLst/>
-                <a:latin typeface="Menlo" panose="020B0609030804020204" pitchFamily="49" charset="0"/>
-              </a:rPr>
-              <a:t> + </a:t>
-            </a:r>
-            <a:r>
-              <a:rPr lang="en-US" sz="1000" b="0" dirty="0">
-                <a:solidFill>
-                  <a:srgbClr val="79C0FF"/>
-                </a:solidFill>
-                <a:effectLst/>
-                <a:latin typeface="Menlo" panose="020B0609030804020204" pitchFamily="49" charset="0"/>
-              </a:rPr>
-              <a:t>.secondary-page-heart</a:t>
-            </a:r>
-            <a:r>
-              <a:rPr lang="en-US" sz="1000" b="0" dirty="0">
-                <a:solidFill>
-                  <a:srgbClr val="E6EDF3"/>
-                </a:solidFill>
-                <a:effectLst/>
-                <a:latin typeface="Menlo" panose="020B0609030804020204" pitchFamily="49" charset="0"/>
-              </a:rPr>
-              <a:t>,</a:t>
-            </a:r>
-          </a:p>
-          <a:p>
-            <a:pPr>
-              <a:spcAft>
-                <a:spcPts val="300"/>
-              </a:spcAft>
-            </a:pPr>
-            <a:r>
-              <a:rPr lang="en-US" sz="1000" b="0" dirty="0">
-                <a:solidFill>
-                  <a:srgbClr val="79C0FF"/>
-                </a:solidFill>
-                <a:effectLst/>
-                <a:latin typeface="Menlo" panose="020B0609030804020204" pitchFamily="49" charset="0"/>
-              </a:rPr>
-              <a:t>#toggle-heart3</a:t>
-            </a:r>
-            <a:r>
-              <a:rPr lang="en-US" sz="1000" b="0" dirty="0">
-                <a:solidFill>
-                  <a:srgbClr val="E6EDF3"/>
-                </a:solidFill>
-                <a:effectLst/>
-                <a:latin typeface="Menlo" panose="020B0609030804020204" pitchFamily="49" charset="0"/>
-              </a:rPr>
-              <a:t> + </a:t>
-            </a:r>
-            <a:r>
-              <a:rPr lang="en-US" sz="1000" b="0" dirty="0">
-                <a:solidFill>
-                  <a:srgbClr val="79C0FF"/>
-                </a:solidFill>
-                <a:effectLst/>
-                <a:latin typeface="Menlo" panose="020B0609030804020204" pitchFamily="49" charset="0"/>
-              </a:rPr>
-              <a:t>.homepage-heart</a:t>
-            </a:r>
-            <a:r>
-              <a:rPr lang="en-US" sz="1000" b="0" dirty="0">
-                <a:solidFill>
-                  <a:srgbClr val="E6EDF3"/>
-                </a:solidFill>
-                <a:effectLst/>
-                <a:latin typeface="Menlo" panose="020B0609030804020204" pitchFamily="49" charset="0"/>
-              </a:rPr>
-              <a:t>,</a:t>
-            </a:r>
-          </a:p>
-          <a:p>
-            <a:pPr>
-              <a:spcAft>
-                <a:spcPts val="300"/>
-              </a:spcAft>
-            </a:pPr>
-            <a:r>
-              <a:rPr lang="en-US" sz="1000" b="0" dirty="0">
-                <a:solidFill>
-                  <a:srgbClr val="79C0FF"/>
-                </a:solidFill>
-                <a:effectLst/>
-                <a:latin typeface="Menlo" panose="020B0609030804020204" pitchFamily="49" charset="0"/>
-              </a:rPr>
-              <a:t>#toggle-heart4</a:t>
-            </a:r>
-            <a:r>
-              <a:rPr lang="en-US" sz="1000" b="0" dirty="0">
-                <a:solidFill>
-                  <a:srgbClr val="E6EDF3"/>
-                </a:solidFill>
-                <a:effectLst/>
-                <a:latin typeface="Menlo" panose="020B0609030804020204" pitchFamily="49" charset="0"/>
-              </a:rPr>
-              <a:t> + </a:t>
-            </a:r>
-            <a:r>
-              <a:rPr lang="en-US" sz="1000" b="0" dirty="0">
-                <a:solidFill>
-                  <a:srgbClr val="79C0FF"/>
-                </a:solidFill>
-                <a:effectLst/>
-                <a:latin typeface="Menlo" panose="020B0609030804020204" pitchFamily="49" charset="0"/>
-              </a:rPr>
-              <a:t>.secondary-page-heart</a:t>
-            </a:r>
-            <a:r>
-              <a:rPr lang="en-US" sz="1000" b="0" dirty="0">
-                <a:solidFill>
-                  <a:srgbClr val="E6EDF3"/>
-                </a:solidFill>
-                <a:effectLst/>
-                <a:latin typeface="Menlo" panose="020B0609030804020204" pitchFamily="49" charset="0"/>
-              </a:rPr>
-              <a:t>,</a:t>
-            </a:r>
-          </a:p>
-          <a:p>
-            <a:pPr>
-              <a:spcAft>
-                <a:spcPts val="300"/>
-              </a:spcAft>
-            </a:pPr>
-            <a:r>
-              <a:rPr lang="en-US" sz="1000" b="0" dirty="0">
-                <a:solidFill>
-                  <a:srgbClr val="79C0FF"/>
-                </a:solidFill>
-                <a:effectLst/>
-                <a:latin typeface="Menlo" panose="020B0609030804020204" pitchFamily="49" charset="0"/>
-              </a:rPr>
-              <a:t>#toggle-heart4</a:t>
-            </a:r>
-            <a:r>
-              <a:rPr lang="en-US" sz="1000" b="0" dirty="0">
-                <a:solidFill>
-                  <a:srgbClr val="E6EDF3"/>
-                </a:solidFill>
-                <a:effectLst/>
-                <a:latin typeface="Menlo" panose="020B0609030804020204" pitchFamily="49" charset="0"/>
-              </a:rPr>
-              <a:t> + </a:t>
-            </a:r>
-            <a:r>
-              <a:rPr lang="en-US" sz="1000" b="0" dirty="0">
-                <a:solidFill>
-                  <a:srgbClr val="79C0FF"/>
-                </a:solidFill>
-                <a:effectLst/>
-                <a:latin typeface="Menlo" panose="020B0609030804020204" pitchFamily="49" charset="0"/>
-              </a:rPr>
-              <a:t>.homepage-heart</a:t>
-            </a:r>
-            <a:r>
-              <a:rPr lang="en-US" sz="1000" b="0" dirty="0">
-                <a:solidFill>
-                  <a:srgbClr val="E6EDF3"/>
-                </a:solidFill>
-                <a:effectLst/>
-                <a:latin typeface="Menlo" panose="020B0609030804020204" pitchFamily="49" charset="0"/>
-              </a:rPr>
-              <a:t> {</a:t>
-            </a:r>
-          </a:p>
-          <a:p>
-            <a:pPr>
-              <a:spcAft>
-                <a:spcPts val="300"/>
-              </a:spcAft>
-            </a:pPr>
-            <a:r>
-              <a:rPr lang="en-US" sz="1000" b="0" dirty="0">
-                <a:solidFill>
-                  <a:srgbClr val="79C0FF"/>
-                </a:solidFill>
-                <a:effectLst/>
-                <a:latin typeface="Menlo" panose="020B0609030804020204" pitchFamily="49" charset="0"/>
-              </a:rPr>
-              <a:t>background-image</a:t>
-            </a:r>
-            <a:r>
-              <a:rPr lang="en-US" sz="1000" b="0" dirty="0">
-                <a:solidFill>
-                  <a:srgbClr val="E6EDF3"/>
-                </a:solidFill>
-                <a:effectLst/>
-                <a:latin typeface="Menlo" panose="020B0609030804020204" pitchFamily="49" charset="0"/>
-              </a:rPr>
-              <a:t>: </a:t>
-            </a:r>
-            <a:r>
-              <a:rPr lang="en-US" sz="1000" b="0" dirty="0" err="1">
-                <a:solidFill>
-                  <a:srgbClr val="79C0FF"/>
-                </a:solidFill>
-                <a:effectLst/>
-                <a:latin typeface="Menlo" panose="020B0609030804020204" pitchFamily="49" charset="0"/>
-              </a:rPr>
-              <a:t>url</a:t>
-            </a:r>
-            <a:r>
-              <a:rPr lang="en-US" sz="1000" b="0" dirty="0">
-                <a:solidFill>
-                  <a:srgbClr val="E6EDF3"/>
-                </a:solidFill>
-                <a:effectLst/>
-                <a:latin typeface="Menlo" panose="020B0609030804020204" pitchFamily="49" charset="0"/>
-              </a:rPr>
-              <a:t>(</a:t>
-            </a:r>
-            <a:r>
-              <a:rPr lang="en-US" sz="1000" b="0" dirty="0">
-                <a:solidFill>
-                  <a:srgbClr val="FFA657"/>
-                </a:solidFill>
-                <a:effectLst/>
-                <a:latin typeface="Menlo" panose="020B0609030804020204" pitchFamily="49" charset="0"/>
-              </a:rPr>
-              <a:t>../Assets/Status=</a:t>
-            </a:r>
-            <a:r>
-              <a:rPr lang="en-US" sz="1000" b="0" dirty="0" err="1">
-                <a:solidFill>
-                  <a:srgbClr val="FFA657"/>
-                </a:solidFill>
-                <a:effectLst/>
-                <a:latin typeface="Menlo" panose="020B0609030804020204" pitchFamily="49" charset="0"/>
-              </a:rPr>
-              <a:t>Default.svg</a:t>
-            </a:r>
-            <a:r>
-              <a:rPr lang="en-US" sz="1000" b="0" dirty="0">
-                <a:solidFill>
-                  <a:srgbClr val="E6EDF3"/>
-                </a:solidFill>
-                <a:effectLst/>
-                <a:latin typeface="Menlo" panose="020B0609030804020204" pitchFamily="49" charset="0"/>
-              </a:rPr>
-              <a:t>);</a:t>
-            </a:r>
-          </a:p>
-          <a:p>
-            <a:pPr>
-              <a:spcAft>
-                <a:spcPts val="300"/>
-              </a:spcAft>
-            </a:pPr>
-            <a:r>
-              <a:rPr lang="en-US" sz="1000" b="0" dirty="0">
-                <a:solidFill>
-                  <a:srgbClr val="7EE787"/>
-                </a:solidFill>
-                <a:effectLst/>
-                <a:latin typeface="Menlo" panose="020B0609030804020204" pitchFamily="49" charset="0"/>
-              </a:rPr>
-              <a:t>&amp;</a:t>
-            </a:r>
-            <a:r>
-              <a:rPr lang="en-US" sz="1000" b="0" dirty="0">
-                <a:solidFill>
-                  <a:srgbClr val="79C0FF"/>
-                </a:solidFill>
-                <a:effectLst/>
-                <a:latin typeface="Menlo" panose="020B0609030804020204" pitchFamily="49" charset="0"/>
-              </a:rPr>
-              <a:t>:hover</a:t>
-            </a:r>
-            <a:r>
-              <a:rPr lang="en-US" sz="1000" b="0" dirty="0">
-                <a:solidFill>
-                  <a:srgbClr val="E6EDF3"/>
-                </a:solidFill>
-                <a:effectLst/>
-                <a:latin typeface="Menlo" panose="020B0609030804020204" pitchFamily="49" charset="0"/>
-              </a:rPr>
-              <a:t> {</a:t>
-            </a:r>
-          </a:p>
-          <a:p>
-            <a:pPr>
-              <a:spcAft>
-                <a:spcPts val="300"/>
-              </a:spcAft>
-            </a:pPr>
-            <a:r>
-              <a:rPr lang="en-US" sz="1000" b="0" dirty="0">
-                <a:solidFill>
-                  <a:srgbClr val="79C0FF"/>
-                </a:solidFill>
-                <a:effectLst/>
-                <a:latin typeface="Menlo" panose="020B0609030804020204" pitchFamily="49" charset="0"/>
-              </a:rPr>
-              <a:t>transform</a:t>
-            </a:r>
-            <a:r>
-              <a:rPr lang="en-US" sz="1000" b="0" dirty="0">
-                <a:solidFill>
-                  <a:srgbClr val="E6EDF3"/>
-                </a:solidFill>
-                <a:effectLst/>
-                <a:latin typeface="Menlo" panose="020B0609030804020204" pitchFamily="49" charset="0"/>
-              </a:rPr>
-              <a:t>: </a:t>
-            </a:r>
-            <a:r>
-              <a:rPr lang="en-US" sz="1000" b="0" dirty="0">
-                <a:solidFill>
-                  <a:srgbClr val="79C0FF"/>
-                </a:solidFill>
-                <a:effectLst/>
-                <a:latin typeface="Menlo" panose="020B0609030804020204" pitchFamily="49" charset="0"/>
-              </a:rPr>
-              <a:t>scale</a:t>
-            </a:r>
-            <a:r>
-              <a:rPr lang="en-US" sz="1000" b="0" dirty="0">
-                <a:solidFill>
-                  <a:srgbClr val="E6EDF3"/>
-                </a:solidFill>
-                <a:effectLst/>
-                <a:latin typeface="Menlo" panose="020B0609030804020204" pitchFamily="49" charset="0"/>
-              </a:rPr>
-              <a:t>(</a:t>
-            </a:r>
-            <a:r>
-              <a:rPr lang="en-US" sz="1000" b="0" dirty="0">
-                <a:solidFill>
-                  <a:srgbClr val="79C0FF"/>
-                </a:solidFill>
-                <a:effectLst/>
-                <a:latin typeface="Menlo" panose="020B0609030804020204" pitchFamily="49" charset="0"/>
-              </a:rPr>
-              <a:t>1.3</a:t>
-            </a:r>
-            <a:r>
-              <a:rPr lang="en-US" sz="1000" b="0" dirty="0">
-                <a:solidFill>
-                  <a:srgbClr val="E6EDF3"/>
-                </a:solidFill>
-                <a:effectLst/>
-                <a:latin typeface="Menlo" panose="020B0609030804020204" pitchFamily="49" charset="0"/>
-              </a:rPr>
-              <a:t>);</a:t>
-            </a:r>
-          </a:p>
-          <a:p>
-            <a:pPr>
-              <a:spcAft>
-                <a:spcPts val="300"/>
-              </a:spcAft>
-            </a:pPr>
-            <a:r>
-              <a:rPr lang="en-US" sz="1000" b="0" dirty="0">
-                <a:solidFill>
-                  <a:srgbClr val="79C0FF"/>
-                </a:solidFill>
-                <a:effectLst/>
-                <a:latin typeface="Menlo" panose="020B0609030804020204" pitchFamily="49" charset="0"/>
-              </a:rPr>
-              <a:t>transition</a:t>
-            </a:r>
-            <a:r>
-              <a:rPr lang="en-US" sz="1000" b="0" dirty="0">
-                <a:solidFill>
-                  <a:srgbClr val="E6EDF3"/>
-                </a:solidFill>
-                <a:effectLst/>
-                <a:latin typeface="Menlo" panose="020B0609030804020204" pitchFamily="49" charset="0"/>
-              </a:rPr>
-              <a:t>: </a:t>
-            </a:r>
-            <a:r>
-              <a:rPr lang="en-US" sz="1000" b="0" dirty="0">
-                <a:solidFill>
-                  <a:srgbClr val="79C0FF"/>
-                </a:solidFill>
-                <a:effectLst/>
-                <a:latin typeface="Menlo" panose="020B0609030804020204" pitchFamily="49" charset="0"/>
-              </a:rPr>
-              <a:t>all</a:t>
-            </a:r>
-            <a:r>
-              <a:rPr lang="en-US" sz="1000" b="0" dirty="0">
-                <a:solidFill>
-                  <a:srgbClr val="E6EDF3"/>
-                </a:solidFill>
-                <a:effectLst/>
-                <a:latin typeface="Menlo" panose="020B0609030804020204" pitchFamily="49" charset="0"/>
-              </a:rPr>
-              <a:t> </a:t>
-            </a:r>
-            <a:r>
-              <a:rPr lang="en-US" sz="1000" b="0" dirty="0">
-                <a:solidFill>
-                  <a:srgbClr val="79C0FF"/>
-                </a:solidFill>
-                <a:effectLst/>
-                <a:latin typeface="Menlo" panose="020B0609030804020204" pitchFamily="49" charset="0"/>
-              </a:rPr>
-              <a:t>1</a:t>
-            </a:r>
-            <a:r>
-              <a:rPr lang="en-US" sz="1000" b="0" dirty="0">
-                <a:solidFill>
-                  <a:srgbClr val="FF7B72"/>
-                </a:solidFill>
-                <a:effectLst/>
-                <a:latin typeface="Menlo" panose="020B0609030804020204" pitchFamily="49" charset="0"/>
-              </a:rPr>
-              <a:t>s</a:t>
-            </a:r>
-            <a:r>
-              <a:rPr lang="en-US" sz="1000" b="0" dirty="0">
-                <a:solidFill>
-                  <a:srgbClr val="E6EDF3"/>
-                </a:solidFill>
-                <a:effectLst/>
-                <a:latin typeface="Menlo" panose="020B0609030804020204" pitchFamily="49" charset="0"/>
-              </a:rPr>
-              <a:t>;</a:t>
-            </a:r>
-          </a:p>
-          <a:p>
-            <a:pPr>
-              <a:spcAft>
-                <a:spcPts val="300"/>
-              </a:spcAft>
-            </a:pPr>
-            <a:r>
-              <a:rPr lang="en-US" sz="1000" b="0" dirty="0">
-                <a:solidFill>
-                  <a:srgbClr val="E6EDF3"/>
-                </a:solidFill>
-                <a:effectLst/>
-                <a:latin typeface="Menlo" panose="020B0609030804020204" pitchFamily="49" charset="0"/>
-              </a:rPr>
-              <a:t>}</a:t>
-            </a:r>
-          </a:p>
-          <a:p>
-            <a:pPr>
-              <a:spcAft>
-                <a:spcPts val="300"/>
-              </a:spcAft>
-            </a:pPr>
-            <a:r>
-              <a:rPr lang="en-US" sz="1000" b="0" dirty="0">
-                <a:solidFill>
-                  <a:srgbClr val="E6EDF3"/>
-                </a:solidFill>
-                <a:effectLst/>
-                <a:latin typeface="Menlo" panose="020B0609030804020204" pitchFamily="49" charset="0"/>
-              </a:rPr>
-              <a:t>}</a:t>
-            </a:r>
-          </a:p>
-        </p:txBody>
-      </p:sp>
-      <p:pic>
-        <p:nvPicPr>
-          <p:cNvPr id="14" name="Content Placeholder 13" descr="A hand pointing at a heart&#10;&#10;Description automatically generated">
-            <a:extLst>
-              <a:ext uri="{FF2B5EF4-FFF2-40B4-BE49-F238E27FC236}">
-                <a16:creationId xmlns:a16="http://schemas.microsoft.com/office/drawing/2014/main" id="{9E949D96-44F1-2D6E-05F1-0DA7B3C7B69F}"/>
+                <a16:creationId xmlns:a16="http://schemas.microsoft.com/office/drawing/2014/main" id="{847AB93E-B868-C5C9-8470-C74FF6CFA369}"/>
               </a:ext>
             </a:extLst>
           </p:cNvPr>
@@ -6784,17 +5735,276 @@
         </p:blipFill>
         <p:spPr>
           <a:xfrm>
-            <a:off x="7194557" y="2488525"/>
-            <a:ext cx="2990903" cy="2990903"/>
+            <a:off x="6256338" y="181397"/>
+            <a:ext cx="5211762" cy="4653652"/>
           </a:xfrm>
         </p:spPr>
       </p:pic>
       <p:sp>
         <p:nvSpPr>
-          <p:cNvPr id="15" name="TextBox 14">
+          <p:cNvPr id="4" name="Text Placeholder 3">
             <a:extLst>
               <a:ext uri="{FF2B5EF4-FFF2-40B4-BE49-F238E27FC236}">
-                <a16:creationId xmlns:a16="http://schemas.microsoft.com/office/drawing/2014/main" id="{F06E3357-1BA3-F2F0-5B2C-D844E16D1128}"/>
+                <a16:creationId xmlns:a16="http://schemas.microsoft.com/office/drawing/2014/main" id="{991FFEB3-9F4D-0999-F450-87BF0F596528}"/>
+              </a:ext>
+            </a:extLst>
+          </p:cNvPr>
+          <p:cNvSpPr>
+            <a:spLocks noGrp="1"/>
+          </p:cNvSpPr>
+          <p:nvPr>
+            <p:ph type="body" sz="half" idx="2"/>
+          </p:nvPr>
+        </p:nvSpPr>
+        <p:spPr>
+          <a:xfrm>
+            <a:off x="0" y="855265"/>
+            <a:ext cx="5180512" cy="2828839"/>
+          </a:xfrm>
+        </p:spPr>
+        <p:txBody>
+          <a:bodyPr/>
+          <a:lstStyle/>
+          <a:p>
+            <a:pPr marL="285750" indent="-285750">
+              <a:lnSpc>
+                <a:spcPct val="100000"/>
+              </a:lnSpc>
+              <a:buFont typeface="Arial" panose="020B0604020202020204" pitchFamily="34" charset="0"/>
+              <a:buChar char="•"/>
+            </a:pPr>
+            <a:r>
+              <a:rPr lang="en-US" dirty="0" err="1"/>
+              <a:t>Entreprise</a:t>
+            </a:r>
+            <a:r>
+              <a:rPr lang="en-US" dirty="0"/>
+              <a:t> de </a:t>
+            </a:r>
+            <a:r>
+              <a:rPr lang="en-US" dirty="0" err="1"/>
+              <a:t>commande</a:t>
+            </a:r>
+            <a:r>
+              <a:rPr lang="en-US" dirty="0"/>
+              <a:t> de </a:t>
+            </a:r>
+            <a:r>
+              <a:rPr lang="en-US" dirty="0" err="1"/>
+              <a:t>repas</a:t>
+            </a:r>
+            <a:r>
+              <a:rPr lang="en-US" dirty="0"/>
+              <a:t> </a:t>
+            </a:r>
+            <a:r>
+              <a:rPr lang="en-US" dirty="0" err="1"/>
+              <a:t>en</a:t>
+            </a:r>
+            <a:r>
+              <a:rPr lang="en-US" dirty="0"/>
+              <a:t> </a:t>
+            </a:r>
+            <a:r>
+              <a:rPr lang="en-US" dirty="0" err="1"/>
+              <a:t>ligne</a:t>
+            </a:r>
+            <a:endParaRPr lang="en-US" dirty="0"/>
+          </a:p>
+          <a:p>
+            <a:pPr marL="285750" indent="-285750">
+              <a:lnSpc>
+                <a:spcPct val="100000"/>
+              </a:lnSpc>
+              <a:buFont typeface="Arial" panose="020B0604020202020204" pitchFamily="34" charset="0"/>
+              <a:buChar char="•"/>
+            </a:pPr>
+            <a:r>
+              <a:rPr lang="en-US" dirty="0" err="1"/>
+              <a:t>Permet</a:t>
+            </a:r>
+            <a:r>
+              <a:rPr lang="en-US" dirty="0"/>
+              <a:t> aux </a:t>
+            </a:r>
+            <a:r>
+              <a:rPr lang="en-US" dirty="0" err="1"/>
+              <a:t>utilisateurs</a:t>
+            </a:r>
+            <a:r>
+              <a:rPr lang="en-US" dirty="0"/>
+              <a:t> de composer </a:t>
+            </a:r>
+            <a:r>
+              <a:rPr lang="en-US" dirty="0" err="1"/>
+              <a:t>leur</a:t>
+            </a:r>
+            <a:r>
+              <a:rPr lang="en-US" dirty="0"/>
+              <a:t> propre menu et de </a:t>
+            </a:r>
+            <a:r>
+              <a:rPr lang="en-US" dirty="0" err="1"/>
+              <a:t>réduire</a:t>
+            </a:r>
+            <a:r>
+              <a:rPr lang="en-US" dirty="0"/>
+              <a:t> </a:t>
+            </a:r>
+            <a:r>
+              <a:rPr lang="en-US" dirty="0" err="1"/>
+              <a:t>leur</a:t>
+            </a:r>
+            <a:r>
+              <a:rPr lang="en-US" dirty="0"/>
+              <a:t> temps </a:t>
+            </a:r>
+            <a:r>
+              <a:rPr lang="en-US" dirty="0" err="1"/>
+              <a:t>d’attente</a:t>
+            </a:r>
+            <a:r>
+              <a:rPr lang="en-US" dirty="0"/>
+              <a:t> sur place</a:t>
+            </a:r>
+          </a:p>
+          <a:p>
+            <a:pPr marL="285750" indent="-285750">
+              <a:lnSpc>
+                <a:spcPct val="100000"/>
+              </a:lnSpc>
+              <a:buFont typeface="Arial" panose="020B0604020202020204" pitchFamily="34" charset="0"/>
+              <a:buChar char="•"/>
+            </a:pPr>
+            <a:r>
+              <a:rPr lang="en-US" dirty="0"/>
+              <a:t>Marché de niche, avec les restaurants </a:t>
+            </a:r>
+            <a:r>
+              <a:rPr lang="en-US" dirty="0" err="1"/>
+              <a:t>luxueux</a:t>
+            </a:r>
+            <a:endParaRPr lang="en-US" dirty="0"/>
+          </a:p>
+          <a:p>
+            <a:pPr marL="285750" indent="-285750">
+              <a:lnSpc>
+                <a:spcPct val="100000"/>
+              </a:lnSpc>
+              <a:buFont typeface="Arial" panose="020B0604020202020204" pitchFamily="34" charset="0"/>
+              <a:buChar char="•"/>
+            </a:pPr>
+            <a:r>
+              <a:rPr lang="en-US" dirty="0" err="1"/>
+              <a:t>Démographie</a:t>
+            </a:r>
+            <a:r>
+              <a:rPr lang="en-US" dirty="0"/>
+              <a:t> </a:t>
+            </a:r>
+            <a:r>
+              <a:rPr lang="en-US" dirty="0" err="1"/>
+              <a:t>ciblée</a:t>
+            </a:r>
+            <a:r>
+              <a:rPr lang="en-US" dirty="0"/>
+              <a:t>: </a:t>
+            </a:r>
+          </a:p>
+          <a:p>
+            <a:pPr marL="742950" lvl="1" indent="-285750">
+              <a:lnSpc>
+                <a:spcPct val="100000"/>
+              </a:lnSpc>
+              <a:buFont typeface="Arial" panose="020B0604020202020204" pitchFamily="34" charset="0"/>
+              <a:buChar char="•"/>
+            </a:pPr>
+            <a:r>
+              <a:rPr lang="en-US" dirty="0"/>
+              <a:t>Classes </a:t>
+            </a:r>
+            <a:r>
+              <a:rPr lang="en-US" dirty="0" err="1"/>
+              <a:t>moyennes</a:t>
+            </a:r>
+            <a:r>
+              <a:rPr lang="en-US" dirty="0"/>
+              <a:t> et </a:t>
+            </a:r>
+            <a:r>
+              <a:rPr lang="en-US" dirty="0" err="1"/>
+              <a:t>supérieures</a:t>
+            </a:r>
+            <a:endParaRPr lang="en-US" dirty="0"/>
+          </a:p>
+          <a:p>
+            <a:pPr marL="742950" lvl="1" indent="-285750">
+              <a:lnSpc>
+                <a:spcPct val="100000"/>
+              </a:lnSpc>
+              <a:buFont typeface="Arial" panose="020B0604020202020204" pitchFamily="34" charset="0"/>
+              <a:buChar char="•"/>
+            </a:pPr>
+            <a:r>
+              <a:rPr lang="en-US" dirty="0" err="1"/>
+              <a:t>Connectées</a:t>
+            </a:r>
+            <a:r>
+              <a:rPr lang="en-US" dirty="0"/>
+              <a:t> et </a:t>
+            </a:r>
+            <a:r>
+              <a:rPr lang="en-US" dirty="0" err="1"/>
+              <a:t>souvent</a:t>
+            </a:r>
+            <a:r>
+              <a:rPr lang="en-US" dirty="0"/>
+              <a:t> </a:t>
+            </a:r>
+            <a:r>
+              <a:rPr lang="en-US" dirty="0" err="1"/>
+              <a:t>pressé</a:t>
+            </a:r>
+            <a:endParaRPr lang="en-US" dirty="0"/>
+          </a:p>
+        </p:txBody>
+      </p:sp>
+      <p:pic>
+        <p:nvPicPr>
+          <p:cNvPr id="8" name="Picture 7" descr="A colorful squares with black text&#10;&#10;Description automatically generated">
+            <a:extLst>
+              <a:ext uri="{FF2B5EF4-FFF2-40B4-BE49-F238E27FC236}">
+                <a16:creationId xmlns:a16="http://schemas.microsoft.com/office/drawing/2014/main" id="{F8F72C38-1259-5BFC-9787-EF58C167BD4C}"/>
+              </a:ext>
+            </a:extLst>
+          </p:cNvPr>
+          <p:cNvPicPr>
+            <a:picLocks noChangeAspect="1"/>
+          </p:cNvPicPr>
+          <p:nvPr/>
+        </p:nvPicPr>
+        <p:blipFill>
+          <a:blip r:embed="rId4"/>
+          <a:stretch>
+            <a:fillRect/>
+          </a:stretch>
+        </p:blipFill>
+        <p:spPr>
+          <a:xfrm>
+            <a:off x="6902139" y="4973729"/>
+            <a:ext cx="3920159" cy="1702874"/>
+          </a:xfrm>
+          <a:prstGeom prst="rect">
+            <a:avLst/>
+          </a:prstGeom>
+        </p:spPr>
+      </p:pic>
+      <p:sp>
+        <p:nvSpPr>
+          <p:cNvPr id="10" name="TextBox 9">
+            <a:extLst>
+              <a:ext uri="{FF2B5EF4-FFF2-40B4-BE49-F238E27FC236}">
+                <a16:creationId xmlns:a16="http://schemas.microsoft.com/office/drawing/2014/main" id="{FC746148-F223-9F4B-F42A-17AB849F54C7}"/>
               </a:ext>
             </a:extLst>
           </p:cNvPr>
@@ -6803,27 +6013,14 @@
         </p:nvSpPr>
         <p:spPr>
           <a:xfrm>
-            <a:off x="6095998" y="362909"/>
-            <a:ext cx="5188019" cy="2031325"/>
+            <a:off x="0" y="3826777"/>
+            <a:ext cx="5211762" cy="2554545"/>
           </a:xfrm>
           <a:prstGeom prst="rect">
             <a:avLst/>
           </a:prstGeom>
+          <a:noFill/>
         </p:spPr>
-        <p:style>
-          <a:lnRef idx="3">
-            <a:schemeClr val="lt1"/>
-          </a:lnRef>
-          <a:fillRef idx="1">
-            <a:schemeClr val="accent3"/>
-          </a:fillRef>
-          <a:effectRef idx="1">
-            <a:schemeClr val="accent3"/>
-          </a:effectRef>
-          <a:fontRef idx="minor">
-            <a:schemeClr val="lt1"/>
-          </a:fontRef>
-        </p:style>
         <p:txBody>
           <a:bodyPr wrap="square" rtlCol="0">
             <a:spAutoFit/>
@@ -6831,380 +6028,189 @@
           <a:lstStyle/>
           <a:p>
             <a:r>
-              <a:rPr lang="en-US" b="0" dirty="0">
-                <a:solidFill>
-                  <a:srgbClr val="E6EDF3"/>
-                </a:solidFill>
-                <a:effectLst/>
-                <a:latin typeface="Menlo" panose="020B0609030804020204" pitchFamily="49" charset="0"/>
-              </a:rPr>
-              <a:t>&lt;</a:t>
-            </a:r>
-            <a:r>
-              <a:rPr lang="en-US" b="0" dirty="0">
-                <a:solidFill>
-                  <a:srgbClr val="7EE787"/>
-                </a:solidFill>
-                <a:effectLst/>
-                <a:latin typeface="Menlo" panose="020B0609030804020204" pitchFamily="49" charset="0"/>
-              </a:rPr>
-              <a:t>label</a:t>
-            </a:r>
-            <a:r>
-              <a:rPr lang="en-US" b="0" dirty="0">
-                <a:solidFill>
-                  <a:srgbClr val="E6EDF3"/>
-                </a:solidFill>
-                <a:effectLst/>
-                <a:latin typeface="Menlo" panose="020B0609030804020204" pitchFamily="49" charset="0"/>
-              </a:rPr>
+              <a:rPr lang="en-FR" sz="1600" dirty="0"/>
+              <a:t>Technogolies :</a:t>
+            </a:r>
+          </a:p>
+          <a:p>
+            <a:pPr marL="285750" indent="-285750">
+              <a:buFont typeface="Arial" panose="020B0604020202020204" pitchFamily="34" charset="0"/>
+              <a:buChar char="•"/>
+            </a:pPr>
+            <a:r>
+              <a:rPr lang="en-US" sz="1600" dirty="0"/>
+              <a:t>CSS, sans JavaScript</a:t>
+            </a:r>
+          </a:p>
+          <a:p>
+            <a:pPr marL="285750" indent="-285750">
+              <a:buFont typeface="Arial" panose="020B0604020202020204" pitchFamily="34" charset="0"/>
+              <a:buChar char="•"/>
+            </a:pPr>
+            <a:r>
+              <a:rPr lang="en-US" sz="1600" dirty="0"/>
+              <a:t>CSS doit </a:t>
+            </a:r>
+            <a:r>
+              <a:rPr lang="en-US" sz="1600" dirty="0" err="1"/>
+              <a:t>être</a:t>
+            </a:r>
+            <a:r>
+              <a:rPr lang="en-US" sz="1600" dirty="0"/>
+              <a:t> disponible dans un </a:t>
+            </a:r>
+            <a:r>
+              <a:rPr lang="en-US" sz="1600" dirty="0" err="1"/>
+              <a:t>ou</a:t>
+            </a:r>
+            <a:r>
+              <a:rPr lang="en-US" sz="1600" dirty="0"/>
               <a:t> </a:t>
             </a:r>
             <a:r>
-              <a:rPr lang="en-US" b="0" dirty="0">
-                <a:solidFill>
-                  <a:srgbClr val="79C0FF"/>
-                </a:solidFill>
-                <a:effectLst/>
-                <a:latin typeface="Menlo" panose="020B0609030804020204" pitchFamily="49" charset="0"/>
-              </a:rPr>
-              <a:t>class</a:t>
-            </a:r>
-            <a:r>
-              <a:rPr lang="en-US" b="0" dirty="0">
-                <a:solidFill>
-                  <a:srgbClr val="E6EDF3"/>
-                </a:solidFill>
-                <a:effectLst/>
-                <a:latin typeface="Menlo" panose="020B0609030804020204" pitchFamily="49" charset="0"/>
-              </a:rPr>
-              <a:t>=</a:t>
-            </a:r>
-            <a:r>
-              <a:rPr lang="en-US" b="0" dirty="0">
-                <a:solidFill>
-                  <a:srgbClr val="A5D6FF"/>
-                </a:solidFill>
-                <a:effectLst/>
-                <a:latin typeface="Menlo" panose="020B0609030804020204" pitchFamily="49" charset="0"/>
-              </a:rPr>
-              <a:t>"</a:t>
-            </a:r>
-            <a:r>
-              <a:rPr lang="en-US" b="0" dirty="0" err="1">
-                <a:solidFill>
-                  <a:srgbClr val="A5D6FF"/>
-                </a:solidFill>
-                <a:effectLst/>
-                <a:latin typeface="Menlo" panose="020B0609030804020204" pitchFamily="49" charset="0"/>
-              </a:rPr>
-              <a:t>labelsecondary</a:t>
-            </a:r>
-            <a:r>
-              <a:rPr lang="en-US" b="0" dirty="0">
-                <a:solidFill>
-                  <a:srgbClr val="A5D6FF"/>
-                </a:solidFill>
-                <a:effectLst/>
-                <a:latin typeface="Menlo" panose="020B0609030804020204" pitchFamily="49" charset="0"/>
-              </a:rPr>
-              <a:t>"</a:t>
-            </a:r>
-            <a:r>
-              <a:rPr lang="en-US" b="0" dirty="0">
-                <a:solidFill>
-                  <a:srgbClr val="E6EDF3"/>
-                </a:solidFill>
-                <a:effectLst/>
-                <a:latin typeface="Menlo" panose="020B0609030804020204" pitchFamily="49" charset="0"/>
-              </a:rPr>
+              <a:rPr lang="en-US" sz="1600" dirty="0" err="1"/>
+              <a:t>plusieursfichiers</a:t>
+            </a:r>
+            <a:r>
+              <a:rPr lang="en-US" sz="1600" dirty="0"/>
               <a:t> </a:t>
             </a:r>
             <a:r>
-              <a:rPr lang="en-US" b="0" dirty="0">
-                <a:solidFill>
-                  <a:srgbClr val="79C0FF"/>
-                </a:solidFill>
-                <a:effectLst/>
-                <a:latin typeface="Menlo" panose="020B0609030804020204" pitchFamily="49" charset="0"/>
-              </a:rPr>
-              <a:t>for</a:t>
-            </a:r>
-            <a:r>
-              <a:rPr lang="en-US" b="0" dirty="0">
-                <a:solidFill>
-                  <a:srgbClr val="E6EDF3"/>
-                </a:solidFill>
-                <a:effectLst/>
-                <a:latin typeface="Menlo" panose="020B0609030804020204" pitchFamily="49" charset="0"/>
-              </a:rPr>
-              <a:t>=</a:t>
-            </a:r>
-            <a:r>
-              <a:rPr lang="en-US" b="0" dirty="0">
-                <a:solidFill>
-                  <a:srgbClr val="A5D6FF"/>
-                </a:solidFill>
-                <a:effectLst/>
-                <a:latin typeface="Menlo" panose="020B0609030804020204" pitchFamily="49" charset="0"/>
-              </a:rPr>
-              <a:t>"toggle-heart"</a:t>
-            </a:r>
-            <a:r>
-              <a:rPr lang="en-US" b="0" dirty="0">
-                <a:solidFill>
-                  <a:srgbClr val="E6EDF3"/>
-                </a:solidFill>
-                <a:effectLst/>
-                <a:latin typeface="Menlo" panose="020B0609030804020204" pitchFamily="49" charset="0"/>
-              </a:rPr>
-              <a:t>&gt;</a:t>
-            </a:r>
-          </a:p>
-          <a:p>
-            <a:r>
-              <a:rPr lang="en-US" b="0" dirty="0">
-                <a:solidFill>
-                  <a:srgbClr val="E6EDF3"/>
-                </a:solidFill>
-                <a:effectLst/>
-                <a:latin typeface="Menlo" panose="020B0609030804020204" pitchFamily="49" charset="0"/>
-              </a:rPr>
-              <a:t>&lt;</a:t>
-            </a:r>
-            <a:r>
-              <a:rPr lang="en-US" b="0" dirty="0">
-                <a:solidFill>
-                  <a:srgbClr val="7EE787"/>
-                </a:solidFill>
-                <a:effectLst/>
-                <a:latin typeface="Menlo" panose="020B0609030804020204" pitchFamily="49" charset="0"/>
-              </a:rPr>
-              <a:t>input</a:t>
-            </a:r>
-            <a:r>
-              <a:rPr lang="en-US" b="0" dirty="0">
-                <a:solidFill>
-                  <a:srgbClr val="E6EDF3"/>
-                </a:solidFill>
-                <a:effectLst/>
-                <a:latin typeface="Menlo" panose="020B0609030804020204" pitchFamily="49" charset="0"/>
-              </a:rPr>
+              <a:rPr lang="en-US" sz="1600" dirty="0" err="1"/>
+              <a:t>dédiés</a:t>
+            </a:r>
+            <a:endParaRPr lang="en-US" sz="1600" dirty="0"/>
+          </a:p>
+          <a:p>
+            <a:pPr marL="285750" indent="-285750">
+              <a:buFont typeface="Arial" panose="020B0604020202020204" pitchFamily="34" charset="0"/>
+              <a:buChar char="•"/>
+            </a:pPr>
+            <a:r>
+              <a:rPr lang="en-US" sz="1600" dirty="0"/>
+              <a:t>MobileFirst</a:t>
+            </a:r>
+          </a:p>
+          <a:p>
+            <a:pPr marL="285750" indent="-285750">
+              <a:buFont typeface="Arial" panose="020B0604020202020204" pitchFamily="34" charset="0"/>
+              <a:buChar char="•"/>
+            </a:pPr>
+            <a:r>
+              <a:rPr lang="en-US" sz="1600" dirty="0" err="1"/>
+              <a:t>Aucun</a:t>
+            </a:r>
+            <a:r>
+              <a:rPr lang="en-US" sz="1600" dirty="0"/>
+              <a:t> framework ne </a:t>
+            </a:r>
+            <a:r>
+              <a:rPr lang="en-US" sz="1600" dirty="0" err="1"/>
+              <a:t>devra</a:t>
+            </a:r>
+            <a:r>
+              <a:rPr lang="en-US" sz="1600" dirty="0"/>
               <a:t> </a:t>
             </a:r>
             <a:r>
-              <a:rPr lang="en-US" b="0" dirty="0">
-                <a:solidFill>
-                  <a:srgbClr val="79C0FF"/>
-                </a:solidFill>
-                <a:effectLst/>
-                <a:latin typeface="Menlo" panose="020B0609030804020204" pitchFamily="49" charset="0"/>
-              </a:rPr>
-              <a:t>id</a:t>
-            </a:r>
-            <a:r>
-              <a:rPr lang="en-US" b="0" dirty="0">
-                <a:solidFill>
-                  <a:srgbClr val="E6EDF3"/>
-                </a:solidFill>
-                <a:effectLst/>
-                <a:latin typeface="Menlo" panose="020B0609030804020204" pitchFamily="49" charset="0"/>
-              </a:rPr>
-              <a:t>=</a:t>
-            </a:r>
-            <a:r>
-              <a:rPr lang="en-US" b="0" dirty="0">
-                <a:solidFill>
-                  <a:srgbClr val="A5D6FF"/>
-                </a:solidFill>
-                <a:effectLst/>
-                <a:latin typeface="Menlo" panose="020B0609030804020204" pitchFamily="49" charset="0"/>
-              </a:rPr>
-              <a:t>"toggle-heart”</a:t>
-            </a:r>
-            <a:r>
-              <a:rPr lang="en-US" dirty="0">
-                <a:solidFill>
-                  <a:srgbClr val="E6EDF3"/>
-                </a:solidFill>
-                <a:latin typeface="Menlo" panose="020B0609030804020204" pitchFamily="49" charset="0"/>
-              </a:rPr>
+              <a:rPr lang="en-US" sz="1600" dirty="0" err="1"/>
+              <a:t>être</a:t>
+            </a:r>
+            <a:r>
+              <a:rPr lang="en-US" sz="1600" dirty="0"/>
               <a:t> </a:t>
             </a:r>
             <a:r>
-              <a:rPr lang="en-US" b="0" dirty="0">
-                <a:solidFill>
-                  <a:srgbClr val="79C0FF"/>
-                </a:solidFill>
-                <a:effectLst/>
-                <a:latin typeface="Menlo" panose="020B0609030804020204" pitchFamily="49" charset="0"/>
-              </a:rPr>
-              <a:t>type</a:t>
-            </a:r>
-            <a:r>
-              <a:rPr lang="en-US" b="0" dirty="0">
-                <a:solidFill>
-                  <a:srgbClr val="E6EDF3"/>
-                </a:solidFill>
-                <a:effectLst/>
-                <a:latin typeface="Menlo" panose="020B0609030804020204" pitchFamily="49" charset="0"/>
-              </a:rPr>
-              <a:t>=</a:t>
-            </a:r>
-            <a:r>
-              <a:rPr lang="en-US" b="0" dirty="0">
-                <a:solidFill>
-                  <a:srgbClr val="A5D6FF"/>
-                </a:solidFill>
-                <a:effectLst/>
-                <a:latin typeface="Menlo" panose="020B0609030804020204" pitchFamily="49" charset="0"/>
-              </a:rPr>
-              <a:t>"checkbox"</a:t>
-            </a:r>
-            <a:r>
-              <a:rPr lang="en-US" b="0" dirty="0">
-                <a:solidFill>
-                  <a:srgbClr val="E6EDF3"/>
-                </a:solidFill>
-                <a:effectLst/>
-                <a:latin typeface="Menlo" panose="020B0609030804020204" pitchFamily="49" charset="0"/>
-              </a:rPr>
-              <a:t>/&gt;</a:t>
-            </a:r>
-          </a:p>
-          <a:p>
-            <a:r>
-              <a:rPr lang="en-US" b="0" dirty="0">
-                <a:solidFill>
-                  <a:srgbClr val="E6EDF3"/>
-                </a:solidFill>
-                <a:effectLst/>
-                <a:latin typeface="Menlo" panose="020B0609030804020204" pitchFamily="49" charset="0"/>
-              </a:rPr>
-              <a:t>&lt;</a:t>
-            </a:r>
-            <a:r>
-              <a:rPr lang="en-US" b="0" dirty="0" err="1">
-                <a:solidFill>
-                  <a:srgbClr val="7EE787"/>
-                </a:solidFill>
-                <a:effectLst/>
-                <a:latin typeface="Menlo" panose="020B0609030804020204" pitchFamily="49" charset="0"/>
-              </a:rPr>
-              <a:t>i</a:t>
-            </a:r>
-            <a:r>
-              <a:rPr lang="en-US" b="0" dirty="0">
-                <a:solidFill>
-                  <a:srgbClr val="E6EDF3"/>
-                </a:solidFill>
-                <a:effectLst/>
-                <a:latin typeface="Menlo" panose="020B0609030804020204" pitchFamily="49" charset="0"/>
-              </a:rPr>
+              <a:rPr lang="en-US" sz="1600" dirty="0" err="1"/>
+              <a:t>utilisé</a:t>
+            </a:r>
+            <a:r>
+              <a:rPr lang="en-US" sz="1600" dirty="0"/>
+              <a:t> ; utilization de SASS </a:t>
+            </a:r>
+            <a:r>
+              <a:rPr lang="en-US" sz="1600" dirty="0" err="1"/>
+              <a:t>serait</a:t>
+            </a:r>
+            <a:r>
+              <a:rPr lang="en-US" sz="1600" dirty="0"/>
+              <a:t> un plus</a:t>
+            </a:r>
+          </a:p>
+          <a:p>
+            <a:pPr marL="285750" indent="-285750">
+              <a:buFont typeface="Arial" panose="020B0604020202020204" pitchFamily="34" charset="0"/>
+              <a:buChar char="•"/>
+            </a:pPr>
+            <a:r>
+              <a:rPr lang="en-US" sz="1600" dirty="0" err="1"/>
+              <a:t>Aucun</a:t>
+            </a:r>
+            <a:r>
+              <a:rPr lang="en-US" sz="1600" dirty="0"/>
               <a:t> </a:t>
             </a:r>
             <a:r>
-              <a:rPr lang="en-US" b="0" dirty="0">
-                <a:solidFill>
-                  <a:srgbClr val="79C0FF"/>
-                </a:solidFill>
-                <a:effectLst/>
-                <a:latin typeface="Menlo" panose="020B0609030804020204" pitchFamily="49" charset="0"/>
-              </a:rPr>
-              <a:t>class</a:t>
-            </a:r>
-            <a:r>
-              <a:rPr lang="en-US" b="0" dirty="0">
-                <a:solidFill>
-                  <a:srgbClr val="E6EDF3"/>
-                </a:solidFill>
-                <a:effectLst/>
-                <a:latin typeface="Menlo" panose="020B0609030804020204" pitchFamily="49" charset="0"/>
-              </a:rPr>
-              <a:t>=</a:t>
-            </a:r>
-            <a:r>
-              <a:rPr lang="en-US" b="0" dirty="0">
-                <a:solidFill>
-                  <a:srgbClr val="A5D6FF"/>
-                </a:solidFill>
-                <a:effectLst/>
-                <a:latin typeface="Menlo" panose="020B0609030804020204" pitchFamily="49" charset="0"/>
-              </a:rPr>
-              <a:t>"secondary-page-heart"</a:t>
-            </a:r>
-            <a:r>
-              <a:rPr lang="en-US" b="0" dirty="0">
-                <a:solidFill>
-                  <a:srgbClr val="E6EDF3"/>
-                </a:solidFill>
-                <a:effectLst/>
-                <a:latin typeface="Menlo" panose="020B0609030804020204" pitchFamily="49" charset="0"/>
-              </a:rPr>
-              <a:t>&gt;&lt;/</a:t>
-            </a:r>
-            <a:r>
-              <a:rPr lang="en-US" b="0" dirty="0" err="1">
-                <a:solidFill>
-                  <a:srgbClr val="7EE787"/>
-                </a:solidFill>
-                <a:effectLst/>
-                <a:latin typeface="Menlo" panose="020B0609030804020204" pitchFamily="49" charset="0"/>
-              </a:rPr>
-              <a:t>i</a:t>
-            </a:r>
-            <a:r>
-              <a:rPr lang="en-US" b="0" dirty="0">
-                <a:solidFill>
-                  <a:srgbClr val="E6EDF3"/>
-                </a:solidFill>
-                <a:effectLst/>
-                <a:latin typeface="Menlo" panose="020B0609030804020204" pitchFamily="49" charset="0"/>
-              </a:rPr>
-              <a:t>&gt;</a:t>
-            </a:r>
-          </a:p>
-          <a:p>
-            <a:r>
-              <a:rPr lang="en-US" b="0" dirty="0">
-                <a:solidFill>
-                  <a:srgbClr val="E6EDF3"/>
-                </a:solidFill>
-                <a:effectLst/>
-                <a:latin typeface="Menlo" panose="020B0609030804020204" pitchFamily="49" charset="0"/>
-              </a:rPr>
-              <a:t>&lt;/</a:t>
-            </a:r>
-            <a:r>
-              <a:rPr lang="en-US" b="0" dirty="0">
-                <a:solidFill>
-                  <a:srgbClr val="7EE787"/>
-                </a:solidFill>
-                <a:effectLst/>
-                <a:latin typeface="Menlo" panose="020B0609030804020204" pitchFamily="49" charset="0"/>
-              </a:rPr>
-              <a:t>label</a:t>
-            </a:r>
-            <a:r>
-              <a:rPr lang="en-US" b="0" dirty="0">
-                <a:solidFill>
-                  <a:srgbClr val="E6EDF3"/>
-                </a:solidFill>
-                <a:effectLst/>
-                <a:latin typeface="Menlo" panose="020B0609030804020204" pitchFamily="49" charset="0"/>
-              </a:rPr>
-              <a:t>&gt;</a:t>
-            </a:r>
-          </a:p>
-          <a:p>
-            <a:endParaRPr lang="en-FR" dirty="0"/>
+              <a:rPr lang="en-US" sz="1600" dirty="0" err="1"/>
+              <a:t>attribut</a:t>
+            </a:r>
+            <a:r>
+              <a:rPr lang="en-US" sz="1600" dirty="0"/>
+              <a:t> style dans </a:t>
+            </a:r>
+            <a:r>
+              <a:rPr lang="en-US" sz="1600" dirty="0" err="1"/>
+              <a:t>une</a:t>
+            </a:r>
+            <a:r>
+              <a:rPr lang="en-US" sz="1600" dirty="0"/>
+              <a:t> </a:t>
+            </a:r>
+            <a:r>
+              <a:rPr lang="en-US" sz="1600" dirty="0" err="1"/>
+              <a:t>balise</a:t>
+            </a:r>
+            <a:r>
+              <a:rPr lang="en-US" sz="1600" dirty="0"/>
+              <a:t> HTML</a:t>
+            </a:r>
+          </a:p>
+          <a:p>
+            <a:pPr marL="285750" indent="-285750">
+              <a:buFont typeface="Arial" panose="020B0604020202020204" pitchFamily="34" charset="0"/>
+              <a:buChar char="•"/>
+            </a:pPr>
+            <a:r>
+              <a:rPr lang="en-US" sz="1600" dirty="0" err="1"/>
+              <a:t>Versionné</a:t>
+            </a:r>
+            <a:r>
+              <a:rPr lang="en-US" sz="1600" dirty="0"/>
+              <a:t> sur GitHub avec des commits </a:t>
+            </a:r>
+            <a:r>
+              <a:rPr lang="en-US" sz="1600" dirty="0" err="1"/>
+              <a:t>réguliers</a:t>
+            </a:r>
+            <a:endParaRPr lang="en-US" sz="1600" dirty="0"/>
+          </a:p>
+          <a:p>
+            <a:pPr marL="285750" indent="-285750">
+              <a:buFont typeface="Arial" panose="020B0604020202020204" pitchFamily="34" charset="0"/>
+              <a:buChar char="•"/>
+            </a:pPr>
+            <a:r>
+              <a:rPr lang="en-US" sz="1600" dirty="0"/>
+              <a:t>accessible sur GitHub Pages</a:t>
+            </a:r>
+            <a:endParaRPr lang="en-FR" sz="1600" dirty="0"/>
           </a:p>
         </p:txBody>
       </p:sp>
     </p:spTree>
     <p:extLst>
       <p:ext uri="{BB962C8B-B14F-4D97-AF65-F5344CB8AC3E}">
-        <p14:creationId xmlns:p14="http://schemas.microsoft.com/office/powerpoint/2010/main" val="4151715450"/>
+        <p14:creationId xmlns:p14="http://schemas.microsoft.com/office/powerpoint/2010/main" val="2362159390"/>
       </p:ext>
     </p:extLst>
   </p:cSld>
@@ -7236,6 +6242,775 @@
           <p:cNvPr id="2" name="Title 1">
             <a:extLst>
               <a:ext uri="{FF2B5EF4-FFF2-40B4-BE49-F238E27FC236}">
+                <a16:creationId xmlns:a16="http://schemas.microsoft.com/office/drawing/2014/main" id="{F7508C9B-753F-F446-0E41-01BCF1E3096C}"/>
+              </a:ext>
+            </a:extLst>
+          </p:cNvPr>
+          <p:cNvSpPr>
+            <a:spLocks noGrp="1"/>
+          </p:cNvSpPr>
+          <p:nvPr>
+            <p:ph type="title"/>
+          </p:nvPr>
+        </p:nvSpPr>
+        <p:spPr>
+          <a:xfrm>
+            <a:off x="0" y="0"/>
+            <a:ext cx="5118652" cy="457200"/>
+          </a:xfrm>
+        </p:spPr>
+        <p:txBody>
+          <a:bodyPr/>
+          <a:lstStyle/>
+          <a:p>
+            <a:r>
+              <a:rPr lang="en-FR" sz="2800" dirty="0"/>
+              <a:t>animation du coeur </a:t>
+            </a:r>
+            <a:r>
+              <a:rPr lang="en-FR" sz="1400" dirty="0"/>
+              <a:t> </a:t>
+            </a:r>
+            <a:r>
+              <a:rPr lang="en-FR" sz="1400" i="1" dirty="0"/>
+              <a:t>SASS</a:t>
+            </a:r>
+            <a:endParaRPr lang="en-FR" sz="2800" i="1" dirty="0"/>
+          </a:p>
+        </p:txBody>
+      </p:sp>
+      <p:pic>
+        <p:nvPicPr>
+          <p:cNvPr id="14" name="Content Placeholder 13" descr="A hand pointing at a heart&#10;&#10;Description automatically generated">
+            <a:extLst>
+              <a:ext uri="{FF2B5EF4-FFF2-40B4-BE49-F238E27FC236}">
+                <a16:creationId xmlns:a16="http://schemas.microsoft.com/office/drawing/2014/main" id="{9E949D96-44F1-2D6E-05F1-0DA7B3C7B69F}"/>
+              </a:ext>
+            </a:extLst>
+          </p:cNvPr>
+          <p:cNvPicPr>
+            <a:picLocks noGrp="1" noChangeAspect="1"/>
+          </p:cNvPicPr>
+          <p:nvPr>
+            <p:ph idx="1"/>
+          </p:nvPr>
+        </p:nvPicPr>
+        <p:blipFill>
+          <a:blip r:embed="rId3"/>
+          <a:stretch>
+            <a:fillRect/>
+          </a:stretch>
+        </p:blipFill>
+        <p:spPr>
+          <a:xfrm>
+            <a:off x="7194557" y="2488525"/>
+            <a:ext cx="2990903" cy="2990903"/>
+          </a:xfrm>
+        </p:spPr>
+      </p:pic>
+      <p:sp>
+        <p:nvSpPr>
+          <p:cNvPr id="15" name="TextBox 14">
+            <a:extLst>
+              <a:ext uri="{FF2B5EF4-FFF2-40B4-BE49-F238E27FC236}">
+                <a16:creationId xmlns:a16="http://schemas.microsoft.com/office/drawing/2014/main" id="{F06E3357-1BA3-F2F0-5B2C-D844E16D1128}"/>
+              </a:ext>
+            </a:extLst>
+          </p:cNvPr>
+          <p:cNvSpPr txBox="1"/>
+          <p:nvPr/>
+        </p:nvSpPr>
+        <p:spPr>
+          <a:xfrm>
+            <a:off x="6095998" y="362909"/>
+            <a:ext cx="5188019" cy="2031325"/>
+          </a:xfrm>
+          <a:prstGeom prst="rect">
+            <a:avLst/>
+          </a:prstGeom>
+        </p:spPr>
+        <p:style>
+          <a:lnRef idx="3">
+            <a:schemeClr val="lt1"/>
+          </a:lnRef>
+          <a:fillRef idx="1">
+            <a:schemeClr val="accent3"/>
+          </a:fillRef>
+          <a:effectRef idx="1">
+            <a:schemeClr val="accent3"/>
+          </a:effectRef>
+          <a:fontRef idx="minor">
+            <a:schemeClr val="lt1"/>
+          </a:fontRef>
+        </p:style>
+        <p:txBody>
+          <a:bodyPr wrap="square" rtlCol="0">
+            <a:spAutoFit/>
+          </a:bodyPr>
+          <a:lstStyle/>
+          <a:p>
+            <a:r>
+              <a:rPr lang="en-US" b="0" dirty="0">
+                <a:solidFill>
+                  <a:srgbClr val="E6EDF3"/>
+                </a:solidFill>
+                <a:effectLst/>
+                <a:latin typeface="Menlo" panose="020B0609030804020204" pitchFamily="49" charset="0"/>
+              </a:rPr>
+              <a:t>&lt;</a:t>
+            </a:r>
+            <a:r>
+              <a:rPr lang="en-US" b="0" dirty="0">
+                <a:solidFill>
+                  <a:srgbClr val="7EE787"/>
+                </a:solidFill>
+                <a:effectLst/>
+                <a:latin typeface="Menlo" panose="020B0609030804020204" pitchFamily="49" charset="0"/>
+              </a:rPr>
+              <a:t>label</a:t>
+            </a:r>
+            <a:r>
+              <a:rPr lang="en-US" b="0" dirty="0">
+                <a:solidFill>
+                  <a:srgbClr val="E6EDF3"/>
+                </a:solidFill>
+                <a:effectLst/>
+                <a:latin typeface="Menlo" panose="020B0609030804020204" pitchFamily="49" charset="0"/>
+              </a:rPr>
+              <a:t> </a:t>
+            </a:r>
+            <a:r>
+              <a:rPr lang="en-US" b="0" dirty="0">
+                <a:solidFill>
+                  <a:srgbClr val="79C0FF"/>
+                </a:solidFill>
+                <a:effectLst/>
+                <a:latin typeface="Menlo" panose="020B0609030804020204" pitchFamily="49" charset="0"/>
+              </a:rPr>
+              <a:t>class</a:t>
+            </a:r>
+            <a:r>
+              <a:rPr lang="en-US" b="0" dirty="0">
+                <a:solidFill>
+                  <a:srgbClr val="E6EDF3"/>
+                </a:solidFill>
+                <a:effectLst/>
+                <a:latin typeface="Menlo" panose="020B0609030804020204" pitchFamily="49" charset="0"/>
+              </a:rPr>
+              <a:t>=</a:t>
+            </a:r>
+            <a:r>
+              <a:rPr lang="en-US" b="0" dirty="0">
+                <a:solidFill>
+                  <a:srgbClr val="A5D6FF"/>
+                </a:solidFill>
+                <a:effectLst/>
+                <a:latin typeface="Menlo" panose="020B0609030804020204" pitchFamily="49" charset="0"/>
+              </a:rPr>
+              <a:t>"</a:t>
+            </a:r>
+            <a:r>
+              <a:rPr lang="en-US" b="0" dirty="0" err="1">
+                <a:solidFill>
+                  <a:srgbClr val="A5D6FF"/>
+                </a:solidFill>
+                <a:effectLst/>
+                <a:latin typeface="Menlo" panose="020B0609030804020204" pitchFamily="49" charset="0"/>
+              </a:rPr>
+              <a:t>labelsecondary</a:t>
+            </a:r>
+            <a:r>
+              <a:rPr lang="en-US" b="0" dirty="0">
+                <a:solidFill>
+                  <a:srgbClr val="A5D6FF"/>
+                </a:solidFill>
+                <a:effectLst/>
+                <a:latin typeface="Menlo" panose="020B0609030804020204" pitchFamily="49" charset="0"/>
+              </a:rPr>
+              <a:t>"</a:t>
+            </a:r>
+            <a:r>
+              <a:rPr lang="en-US" b="0" dirty="0">
+                <a:solidFill>
+                  <a:srgbClr val="E6EDF3"/>
+                </a:solidFill>
+                <a:effectLst/>
+                <a:latin typeface="Menlo" panose="020B0609030804020204" pitchFamily="49" charset="0"/>
+              </a:rPr>
+              <a:t> </a:t>
+            </a:r>
+            <a:r>
+              <a:rPr lang="en-US" b="0" dirty="0">
+                <a:solidFill>
+                  <a:srgbClr val="79C0FF"/>
+                </a:solidFill>
+                <a:effectLst/>
+                <a:latin typeface="Menlo" panose="020B0609030804020204" pitchFamily="49" charset="0"/>
+              </a:rPr>
+              <a:t>for</a:t>
+            </a:r>
+            <a:r>
+              <a:rPr lang="en-US" b="0" dirty="0">
+                <a:solidFill>
+                  <a:srgbClr val="E6EDF3"/>
+                </a:solidFill>
+                <a:effectLst/>
+                <a:latin typeface="Menlo" panose="020B0609030804020204" pitchFamily="49" charset="0"/>
+              </a:rPr>
+              <a:t>=</a:t>
+            </a:r>
+            <a:r>
+              <a:rPr lang="en-US" b="0" dirty="0">
+                <a:solidFill>
+                  <a:srgbClr val="A5D6FF"/>
+                </a:solidFill>
+                <a:effectLst/>
+                <a:latin typeface="Menlo" panose="020B0609030804020204" pitchFamily="49" charset="0"/>
+              </a:rPr>
+              <a:t>"toggle-heart"</a:t>
+            </a:r>
+            <a:r>
+              <a:rPr lang="en-US" b="0" dirty="0">
+                <a:solidFill>
+                  <a:srgbClr val="E6EDF3"/>
+                </a:solidFill>
+                <a:effectLst/>
+                <a:latin typeface="Menlo" panose="020B0609030804020204" pitchFamily="49" charset="0"/>
+              </a:rPr>
+              <a:t>&gt;</a:t>
+            </a:r>
+          </a:p>
+          <a:p>
+            <a:r>
+              <a:rPr lang="en-US" b="0" dirty="0">
+                <a:solidFill>
+                  <a:srgbClr val="E6EDF3"/>
+                </a:solidFill>
+                <a:effectLst/>
+                <a:latin typeface="Menlo" panose="020B0609030804020204" pitchFamily="49" charset="0"/>
+              </a:rPr>
+              <a:t>&lt;</a:t>
+            </a:r>
+            <a:r>
+              <a:rPr lang="en-US" b="0" dirty="0">
+                <a:solidFill>
+                  <a:srgbClr val="7EE787"/>
+                </a:solidFill>
+                <a:effectLst/>
+                <a:latin typeface="Menlo" panose="020B0609030804020204" pitchFamily="49" charset="0"/>
+              </a:rPr>
+              <a:t>input</a:t>
+            </a:r>
+            <a:r>
+              <a:rPr lang="en-US" b="0" dirty="0">
+                <a:solidFill>
+                  <a:srgbClr val="E6EDF3"/>
+                </a:solidFill>
+                <a:effectLst/>
+                <a:latin typeface="Menlo" panose="020B0609030804020204" pitchFamily="49" charset="0"/>
+              </a:rPr>
+              <a:t> </a:t>
+            </a:r>
+            <a:r>
+              <a:rPr lang="en-US" b="0" dirty="0">
+                <a:solidFill>
+                  <a:srgbClr val="79C0FF"/>
+                </a:solidFill>
+                <a:effectLst/>
+                <a:latin typeface="Menlo" panose="020B0609030804020204" pitchFamily="49" charset="0"/>
+              </a:rPr>
+              <a:t>id</a:t>
+            </a:r>
+            <a:r>
+              <a:rPr lang="en-US" b="0" dirty="0">
+                <a:solidFill>
+                  <a:srgbClr val="E6EDF3"/>
+                </a:solidFill>
+                <a:effectLst/>
+                <a:latin typeface="Menlo" panose="020B0609030804020204" pitchFamily="49" charset="0"/>
+              </a:rPr>
+              <a:t>=</a:t>
+            </a:r>
+            <a:r>
+              <a:rPr lang="en-US" b="0" dirty="0">
+                <a:solidFill>
+                  <a:srgbClr val="A5D6FF"/>
+                </a:solidFill>
+                <a:effectLst/>
+                <a:latin typeface="Menlo" panose="020B0609030804020204" pitchFamily="49" charset="0"/>
+              </a:rPr>
+              <a:t>"toggle-heart”</a:t>
+            </a:r>
+            <a:r>
+              <a:rPr lang="en-US" dirty="0">
+                <a:solidFill>
+                  <a:srgbClr val="E6EDF3"/>
+                </a:solidFill>
+                <a:latin typeface="Menlo" panose="020B0609030804020204" pitchFamily="49" charset="0"/>
+              </a:rPr>
+              <a:t> </a:t>
+            </a:r>
+            <a:r>
+              <a:rPr lang="en-US" b="0" dirty="0">
+                <a:solidFill>
+                  <a:srgbClr val="79C0FF"/>
+                </a:solidFill>
+                <a:effectLst/>
+                <a:latin typeface="Menlo" panose="020B0609030804020204" pitchFamily="49" charset="0"/>
+              </a:rPr>
+              <a:t>type</a:t>
+            </a:r>
+            <a:r>
+              <a:rPr lang="en-US" b="0" dirty="0">
+                <a:solidFill>
+                  <a:srgbClr val="E6EDF3"/>
+                </a:solidFill>
+                <a:effectLst/>
+                <a:latin typeface="Menlo" panose="020B0609030804020204" pitchFamily="49" charset="0"/>
+              </a:rPr>
+              <a:t>=</a:t>
+            </a:r>
+            <a:r>
+              <a:rPr lang="en-US" b="0" dirty="0">
+                <a:solidFill>
+                  <a:srgbClr val="A5D6FF"/>
+                </a:solidFill>
+                <a:effectLst/>
+                <a:latin typeface="Menlo" panose="020B0609030804020204" pitchFamily="49" charset="0"/>
+              </a:rPr>
+              <a:t>"checkbox"</a:t>
+            </a:r>
+            <a:r>
+              <a:rPr lang="en-US" b="0" dirty="0">
+                <a:solidFill>
+                  <a:srgbClr val="E6EDF3"/>
+                </a:solidFill>
+                <a:effectLst/>
+                <a:latin typeface="Menlo" panose="020B0609030804020204" pitchFamily="49" charset="0"/>
+              </a:rPr>
+              <a:t>/&gt;</a:t>
+            </a:r>
+          </a:p>
+          <a:p>
+            <a:r>
+              <a:rPr lang="en-US" b="0" dirty="0">
+                <a:solidFill>
+                  <a:srgbClr val="E6EDF3"/>
+                </a:solidFill>
+                <a:effectLst/>
+                <a:latin typeface="Menlo" panose="020B0609030804020204" pitchFamily="49" charset="0"/>
+              </a:rPr>
+              <a:t>&lt;</a:t>
+            </a:r>
+            <a:r>
+              <a:rPr lang="en-US" b="0" dirty="0" err="1">
+                <a:solidFill>
+                  <a:srgbClr val="7EE787"/>
+                </a:solidFill>
+                <a:effectLst/>
+                <a:latin typeface="Menlo" panose="020B0609030804020204" pitchFamily="49" charset="0"/>
+              </a:rPr>
+              <a:t>i</a:t>
+            </a:r>
+            <a:r>
+              <a:rPr lang="en-US" b="0" dirty="0">
+                <a:solidFill>
+                  <a:srgbClr val="E6EDF3"/>
+                </a:solidFill>
+                <a:effectLst/>
+                <a:latin typeface="Menlo" panose="020B0609030804020204" pitchFamily="49" charset="0"/>
+              </a:rPr>
+              <a:t> </a:t>
+            </a:r>
+            <a:r>
+              <a:rPr lang="en-US" b="0" dirty="0">
+                <a:solidFill>
+                  <a:srgbClr val="79C0FF"/>
+                </a:solidFill>
+                <a:effectLst/>
+                <a:latin typeface="Menlo" panose="020B0609030804020204" pitchFamily="49" charset="0"/>
+              </a:rPr>
+              <a:t>class</a:t>
+            </a:r>
+            <a:r>
+              <a:rPr lang="en-US" b="0" dirty="0">
+                <a:solidFill>
+                  <a:srgbClr val="E6EDF3"/>
+                </a:solidFill>
+                <a:effectLst/>
+                <a:latin typeface="Menlo" panose="020B0609030804020204" pitchFamily="49" charset="0"/>
+              </a:rPr>
+              <a:t>=</a:t>
+            </a:r>
+            <a:r>
+              <a:rPr lang="en-US" b="0" dirty="0">
+                <a:solidFill>
+                  <a:srgbClr val="A5D6FF"/>
+                </a:solidFill>
+                <a:effectLst/>
+                <a:latin typeface="Menlo" panose="020B0609030804020204" pitchFamily="49" charset="0"/>
+              </a:rPr>
+              <a:t>"secondary-page-heart"</a:t>
+            </a:r>
+            <a:r>
+              <a:rPr lang="en-US" b="0" dirty="0">
+                <a:solidFill>
+                  <a:srgbClr val="E6EDF3"/>
+                </a:solidFill>
+                <a:effectLst/>
+                <a:latin typeface="Menlo" panose="020B0609030804020204" pitchFamily="49" charset="0"/>
+              </a:rPr>
+              <a:t>&gt;&lt;/</a:t>
+            </a:r>
+            <a:r>
+              <a:rPr lang="en-US" b="0" dirty="0" err="1">
+                <a:solidFill>
+                  <a:srgbClr val="7EE787"/>
+                </a:solidFill>
+                <a:effectLst/>
+                <a:latin typeface="Menlo" panose="020B0609030804020204" pitchFamily="49" charset="0"/>
+              </a:rPr>
+              <a:t>i</a:t>
+            </a:r>
+            <a:r>
+              <a:rPr lang="en-US" b="0" dirty="0">
+                <a:solidFill>
+                  <a:srgbClr val="E6EDF3"/>
+                </a:solidFill>
+                <a:effectLst/>
+                <a:latin typeface="Menlo" panose="020B0609030804020204" pitchFamily="49" charset="0"/>
+              </a:rPr>
+              <a:t>&gt;</a:t>
+            </a:r>
+          </a:p>
+          <a:p>
+            <a:r>
+              <a:rPr lang="en-US" b="0" dirty="0">
+                <a:solidFill>
+                  <a:srgbClr val="E6EDF3"/>
+                </a:solidFill>
+                <a:effectLst/>
+                <a:latin typeface="Menlo" panose="020B0609030804020204" pitchFamily="49" charset="0"/>
+              </a:rPr>
+              <a:t>&lt;/</a:t>
+            </a:r>
+            <a:r>
+              <a:rPr lang="en-US" b="0" dirty="0">
+                <a:solidFill>
+                  <a:srgbClr val="7EE787"/>
+                </a:solidFill>
+                <a:effectLst/>
+                <a:latin typeface="Menlo" panose="020B0609030804020204" pitchFamily="49" charset="0"/>
+              </a:rPr>
+              <a:t>label</a:t>
+            </a:r>
+            <a:r>
+              <a:rPr lang="en-US" b="0" dirty="0">
+                <a:solidFill>
+                  <a:srgbClr val="E6EDF3"/>
+                </a:solidFill>
+                <a:effectLst/>
+                <a:latin typeface="Menlo" panose="020B0609030804020204" pitchFamily="49" charset="0"/>
+              </a:rPr>
+              <a:t>&gt;</a:t>
+            </a:r>
+          </a:p>
+          <a:p>
+            <a:endParaRPr lang="en-FR" dirty="0"/>
+          </a:p>
+        </p:txBody>
+      </p:sp>
+      <p:sp>
+        <p:nvSpPr>
+          <p:cNvPr id="5" name="Text Placeholder 4">
+            <a:extLst>
+              <a:ext uri="{FF2B5EF4-FFF2-40B4-BE49-F238E27FC236}">
+                <a16:creationId xmlns:a16="http://schemas.microsoft.com/office/drawing/2014/main" id="{8F684BDB-FF29-1F12-F55F-2FF40B9414C9}"/>
+              </a:ext>
+            </a:extLst>
+          </p:cNvPr>
+          <p:cNvSpPr>
+            <a:spLocks noGrp="1"/>
+          </p:cNvSpPr>
+          <p:nvPr>
+            <p:ph type="body" sz="half" idx="2"/>
+          </p:nvPr>
+        </p:nvSpPr>
+        <p:spPr/>
+        <p:txBody>
+          <a:bodyPr/>
+          <a:lstStyle/>
+          <a:p>
+            <a:endParaRPr lang="en-FR"/>
+          </a:p>
+        </p:txBody>
+      </p:sp>
+      <p:pic>
+        <p:nvPicPr>
+          <p:cNvPr id="7" name="Picture 6" descr="A screenshot of a computer program&#10;&#10;Description automatically generated">
+            <a:extLst>
+              <a:ext uri="{FF2B5EF4-FFF2-40B4-BE49-F238E27FC236}">
+                <a16:creationId xmlns:a16="http://schemas.microsoft.com/office/drawing/2014/main" id="{8BA5943F-4B9C-95EF-9340-B9C48D7653B7}"/>
+              </a:ext>
+            </a:extLst>
+          </p:cNvPr>
+          <p:cNvPicPr>
+            <a:picLocks noChangeAspect="1"/>
+          </p:cNvPicPr>
+          <p:nvPr/>
+        </p:nvPicPr>
+        <p:blipFill>
+          <a:blip r:embed="rId4"/>
+          <a:stretch>
+            <a:fillRect/>
+          </a:stretch>
+        </p:blipFill>
+        <p:spPr>
+          <a:xfrm>
+            <a:off x="339356" y="481320"/>
+            <a:ext cx="4624808" cy="5895359"/>
+          </a:xfrm>
+          <a:prstGeom prst="rect">
+            <a:avLst/>
+          </a:prstGeom>
+        </p:spPr>
+      </p:pic>
+    </p:spTree>
+    <p:extLst>
+      <p:ext uri="{BB962C8B-B14F-4D97-AF65-F5344CB8AC3E}">
+        <p14:creationId xmlns:p14="http://schemas.microsoft.com/office/powerpoint/2010/main" val="4151715450"/>
+      </p:ext>
+    </p:extLst>
+  </p:cSld>
+  <p:clrMapOvr>
+    <a:masterClrMapping/>
+  </p:clrMapOvr>
+</p:sld>
+</file>
+
+<file path=ppt/slides/slide4.xml><?xml version="1.0" encoding="utf-8"?>
+<p:sld xmlns:a="http://schemas.openxmlformats.org/drawingml/2006/main" xmlns:r="http://schemas.openxmlformats.org/officeDocument/2006/relationships" xmlns:p="http://schemas.openxmlformats.org/presentationml/2006/main">
+  <p:cSld>
+    <p:spTree>
+      <p:nvGrpSpPr>
+        <p:cNvPr id="1" name=""/>
+        <p:cNvGrpSpPr/>
+        <p:nvPr/>
+      </p:nvGrpSpPr>
+      <p:grpSpPr>
+        <a:xfrm>
+          <a:off x="0" y="0"/>
+          <a:ext cx="0" cy="0"/>
+          <a:chOff x="0" y="0"/>
+          <a:chExt cx="0" cy="0"/>
+        </a:xfrm>
+      </p:grpSpPr>
+      <p:pic>
+        <p:nvPicPr>
+          <p:cNvPr id="7" name="Content Placeholder 6" descr="A purple rectangle with white text&#10;&#10;Description automatically generated">
+            <a:extLst>
+              <a:ext uri="{FF2B5EF4-FFF2-40B4-BE49-F238E27FC236}">
+                <a16:creationId xmlns:a16="http://schemas.microsoft.com/office/drawing/2014/main" id="{AF1CDE28-DC94-0748-DB68-398CE3D8B096}"/>
+              </a:ext>
+            </a:extLst>
+          </p:cNvPr>
+          <p:cNvPicPr>
+            <a:picLocks noGrp="1" noChangeAspect="1"/>
+          </p:cNvPicPr>
+          <p:nvPr>
+            <p:ph idx="1"/>
+          </p:nvPr>
+        </p:nvPicPr>
+        <p:blipFill>
+          <a:blip r:embed="rId3"/>
+          <a:stretch>
+            <a:fillRect/>
+          </a:stretch>
+        </p:blipFill>
+        <p:spPr>
+          <a:xfrm>
+            <a:off x="6284119" y="2536825"/>
+            <a:ext cx="5156200" cy="1473200"/>
+          </a:xfrm>
+        </p:spPr>
+      </p:pic>
+      <p:sp>
+        <p:nvSpPr>
+          <p:cNvPr id="4" name="Text Placeholder 3">
+            <a:extLst>
+              <a:ext uri="{FF2B5EF4-FFF2-40B4-BE49-F238E27FC236}">
+                <a16:creationId xmlns:a16="http://schemas.microsoft.com/office/drawing/2014/main" id="{AA122D57-D060-FB36-2527-FEDF94279E05}"/>
+              </a:ext>
+            </a:extLst>
+          </p:cNvPr>
+          <p:cNvSpPr>
+            <a:spLocks noGrp="1"/>
+          </p:cNvSpPr>
+          <p:nvPr>
+            <p:ph type="body" sz="half" idx="2"/>
+          </p:nvPr>
+        </p:nvSpPr>
+        <p:spPr>
+          <a:xfrm>
+            <a:off x="644387" y="1923472"/>
+            <a:ext cx="3855720" cy="3011056"/>
+          </a:xfrm>
+        </p:spPr>
+        <p:txBody>
+          <a:bodyPr/>
+          <a:lstStyle/>
+          <a:p>
+            <a:endParaRPr lang="en-FR" dirty="0"/>
+          </a:p>
+        </p:txBody>
+      </p:sp>
+      <p:sp>
+        <p:nvSpPr>
+          <p:cNvPr id="5" name="Title 1">
+            <a:extLst>
+              <a:ext uri="{FF2B5EF4-FFF2-40B4-BE49-F238E27FC236}">
+                <a16:creationId xmlns:a16="http://schemas.microsoft.com/office/drawing/2014/main" id="{6CDD9547-F1E2-4EE0-141E-A1E45B8CFCAB}"/>
+              </a:ext>
+            </a:extLst>
+          </p:cNvPr>
+          <p:cNvSpPr>
+            <a:spLocks noGrp="1"/>
+          </p:cNvSpPr>
+          <p:nvPr>
+            <p:ph type="title"/>
+          </p:nvPr>
+        </p:nvSpPr>
+        <p:spPr>
+          <a:xfrm>
+            <a:off x="0" y="6532"/>
+            <a:ext cx="4148546" cy="542108"/>
+          </a:xfrm>
+        </p:spPr>
+        <p:txBody>
+          <a:bodyPr/>
+          <a:lstStyle/>
+          <a:p>
+            <a:r>
+              <a:rPr lang="en-FR" sz="2800" dirty="0"/>
+              <a:t>animation des boutons </a:t>
+            </a:r>
+            <a:r>
+              <a:rPr lang="en-FR" sz="1400" i="1" dirty="0"/>
+              <a:t>SASS</a:t>
+            </a:r>
+            <a:endParaRPr lang="en-FR" sz="2800" i="1" dirty="0"/>
+          </a:p>
+        </p:txBody>
+      </p:sp>
+      <p:pic>
+        <p:nvPicPr>
+          <p:cNvPr id="9" name="Picture 8" descr="A screen shot of a computer program&#10;&#10;Description automatically generated">
+            <a:extLst>
+              <a:ext uri="{FF2B5EF4-FFF2-40B4-BE49-F238E27FC236}">
+                <a16:creationId xmlns:a16="http://schemas.microsoft.com/office/drawing/2014/main" id="{A5ED6271-FA3A-A03A-B136-745FE5BB82F3}"/>
+              </a:ext>
+            </a:extLst>
+          </p:cNvPr>
+          <p:cNvPicPr>
+            <a:picLocks noChangeAspect="1"/>
+          </p:cNvPicPr>
+          <p:nvPr/>
+        </p:nvPicPr>
+        <p:blipFill>
+          <a:blip r:embed="rId4"/>
+          <a:stretch>
+            <a:fillRect/>
+          </a:stretch>
+        </p:blipFill>
+        <p:spPr>
+          <a:xfrm>
+            <a:off x="225784" y="1887167"/>
+            <a:ext cx="4692926" cy="3083666"/>
+          </a:xfrm>
+          <a:prstGeom prst="rect">
+            <a:avLst/>
+          </a:prstGeom>
+        </p:spPr>
+      </p:pic>
+      <p:sp>
+        <p:nvSpPr>
+          <p:cNvPr id="10" name="TextBox 9">
+            <a:extLst>
+              <a:ext uri="{FF2B5EF4-FFF2-40B4-BE49-F238E27FC236}">
+                <a16:creationId xmlns:a16="http://schemas.microsoft.com/office/drawing/2014/main" id="{5C7ECF81-C212-D51B-A3DF-D78554854424}"/>
+              </a:ext>
+            </a:extLst>
+          </p:cNvPr>
+          <p:cNvSpPr txBox="1"/>
+          <p:nvPr/>
+        </p:nvSpPr>
+        <p:spPr>
+          <a:xfrm>
+            <a:off x="225784" y="5007138"/>
+            <a:ext cx="3649250" cy="646331"/>
+          </a:xfrm>
+          <a:prstGeom prst="rect">
+            <a:avLst/>
+          </a:prstGeom>
+          <a:noFill/>
+        </p:spPr>
+        <p:txBody>
+          <a:bodyPr wrap="square" rtlCol="0">
+            <a:spAutoFit/>
+          </a:bodyPr>
+          <a:lstStyle/>
+          <a:p>
+            <a:r>
+              <a:rPr lang="en-US" b="0" dirty="0">
+                <a:effectLst/>
+                <a:latin typeface="Menlo" panose="020B0609030804020204" pitchFamily="49" charset="0"/>
+              </a:rPr>
+              <a:t>// BUTTON ANIMATION</a:t>
+            </a:r>
+          </a:p>
+          <a:p>
+            <a:r>
+              <a:rPr lang="en-FR" dirty="0"/>
+              <a:t>L-1141 style.scss</a:t>
+            </a:r>
+          </a:p>
+        </p:txBody>
+      </p:sp>
+    </p:spTree>
+    <p:extLst>
+      <p:ext uri="{BB962C8B-B14F-4D97-AF65-F5344CB8AC3E}">
+        <p14:creationId xmlns:p14="http://schemas.microsoft.com/office/powerpoint/2010/main" val="1061368146"/>
+      </p:ext>
+    </p:extLst>
+  </p:cSld>
+  <p:clrMapOvr>
+    <a:masterClrMapping/>
+  </p:clrMapOvr>
+</p:sld>
+</file>
+
+<file path=ppt/slides/slide5.xml><?xml version="1.0" encoding="utf-8"?>
+<p:sld xmlns:a="http://schemas.openxmlformats.org/drawingml/2006/main" xmlns:r="http://schemas.openxmlformats.org/officeDocument/2006/relationships" xmlns:p="http://schemas.openxmlformats.org/presentationml/2006/main">
+  <p:cSld>
+    <p:spTree>
+      <p:nvGrpSpPr>
+        <p:cNvPr id="1" name=""/>
+        <p:cNvGrpSpPr/>
+        <p:nvPr/>
+      </p:nvGrpSpPr>
+      <p:grpSpPr>
+        <a:xfrm>
+          <a:off x="0" y="0"/>
+          <a:ext cx="0" cy="0"/>
+          <a:chOff x="0" y="0"/>
+          <a:chExt cx="0" cy="0"/>
+        </a:xfrm>
+      </p:grpSpPr>
+      <p:sp>
+        <p:nvSpPr>
+          <p:cNvPr id="2" name="Title 1">
+            <a:extLst>
+              <a:ext uri="{FF2B5EF4-FFF2-40B4-BE49-F238E27FC236}">
                 <a16:creationId xmlns:a16="http://schemas.microsoft.com/office/drawing/2014/main" id="{9AFBF259-E184-4E00-CFEA-8E7BBFC4124C}"/>
               </a:ext>
             </a:extLst>
@@ -7258,13 +7033,14 @@
           <a:lstStyle/>
           <a:p>
             <a:r>
-              <a:rPr lang="en-US" dirty="0">
+              <a:rPr lang="en-US" b="0" i="0" dirty="0" err="1">
                 <a:solidFill>
                   <a:srgbClr val="271A38"/>
                 </a:solidFill>
+                <a:effectLst/>
                 <a:latin typeface="Inter"/>
               </a:rPr>
-              <a:t>S</a:t>
+              <a:t>sélecteur</a:t>
             </a:r>
             <a:r>
               <a:rPr lang="en-US" b="0" i="0" dirty="0">
@@ -7274,7 +7050,7 @@
                 <a:effectLst/>
                 <a:latin typeface="Inter"/>
               </a:rPr>
-              <a:t>électeur de plat </a:t>
+              <a:t> de plat </a:t>
             </a:r>
             <a:r>
               <a:rPr lang="en-US" sz="1800" b="0" i="1" dirty="0">
@@ -7392,7 +7168,7 @@
 </p:sld>
 </file>
 
-<file path=ppt/slides/slide4.xml><?xml version="1.0" encoding="utf-8"?>
+<file path=ppt/slides/slide6.xml><?xml version="1.0" encoding="utf-8"?>
 <p:sld xmlns:a="http://schemas.openxmlformats.org/drawingml/2006/main" xmlns:r="http://schemas.openxmlformats.org/officeDocument/2006/relationships" xmlns:p="http://schemas.openxmlformats.org/presentationml/2006/main">
   <p:cSld>
     <p:spTree>
@@ -7427,8 +7203,8 @@
         </p:nvSpPr>
         <p:spPr>
           <a:xfrm>
-            <a:off x="0" y="0"/>
-            <a:ext cx="5284270" cy="1203158"/>
+            <a:off x="36254" y="293636"/>
+            <a:ext cx="5804453" cy="1203158"/>
           </a:xfrm>
         </p:spPr>
         <p:txBody>
@@ -7436,7 +7212,7 @@
           <a:lstStyle/>
           <a:p>
             <a:r>
-              <a:rPr lang="en-US" b="0" i="0" dirty="0">
+              <a:rPr lang="en-US" sz="3200" b="0" i="0" dirty="0">
                 <a:solidFill>
                   <a:srgbClr val="271A38"/>
                 </a:solidFill>
@@ -7446,7 +7222,7 @@
               <a:t>loader de la page </a:t>
             </a:r>
             <a:r>
-              <a:rPr lang="en-US" b="0" i="0" dirty="0" err="1">
+              <a:rPr lang="en-US" sz="3200" b="0" i="0" dirty="0" err="1">
                 <a:solidFill>
                   <a:srgbClr val="271A38"/>
                 </a:solidFill>
@@ -7456,7 +7232,7 @@
               <a:t>d’accueil</a:t>
             </a:r>
             <a:r>
-              <a:rPr lang="en-US" b="0" i="0" dirty="0">
+              <a:rPr lang="en-US" sz="3200" b="0" i="0" dirty="0">
                 <a:solidFill>
                   <a:srgbClr val="271A38"/>
                 </a:solidFill>
@@ -7622,7 +7398,7 @@
 </p:sld>
 </file>
 
-<file path=ppt/slides/slide5.xml><?xml version="1.0" encoding="utf-8"?>
+<file path=ppt/slides/slide7.xml><?xml version="1.0" encoding="utf-8"?>
 <p:sld xmlns:a="http://schemas.openxmlformats.org/drawingml/2006/main" xmlns:r="http://schemas.openxmlformats.org/officeDocument/2006/relationships" xmlns:p="http://schemas.openxmlformats.org/presentationml/2006/main">
   <p:cSld>
     <p:spTree>
@@ -7816,7 +7592,7 @@
 </p:sld>
 </file>
 
-<file path=ppt/slides/slide6.xml><?xml version="1.0" encoding="utf-8"?>
+<file path=ppt/slides/slide8.xml><?xml version="1.0" encoding="utf-8"?>
 <p:sld xmlns:a="http://schemas.openxmlformats.org/drawingml/2006/main" xmlns:r="http://schemas.openxmlformats.org/officeDocument/2006/relationships" xmlns:p="http://schemas.openxmlformats.org/presentationml/2006/main">
   <p:cSld>
     <p:spTree>

</xml_diff>